<commit_message>
added slide and slight text change pmp
</commit_message>
<xml_diff>
--- a/2nd-Factor.pptx
+++ b/2nd-Factor.pptx
@@ -12,6 +12,7 @@
     <p:sldId id="260" r:id="rId6"/>
     <p:sldId id="261" r:id="rId7"/>
     <p:sldId id="262" r:id="rId8"/>
+    <p:sldId id="263" r:id="rId9"/>
   </p:sldIdLst>
   <p:sldSz cx="12192000" cy="6858000"/>
   <p:notesSz cx="6858000" cy="9144000"/>
@@ -932,7 +933,7 @@
           <a:p>
             <a:fld id="{00AA4164-34D5-4452-8196-C085709679C2}" type="datetimeFigureOut">
               <a:rPr lang="nl-NL" smtClean="0"/>
-              <a:t>18-1-2021</a:t>
+              <a:t>20-1-2021</a:t>
             </a:fld>
             <a:endParaRPr lang="nl-NL"/>
           </a:p>
@@ -974,7 +975,7 @@
           <a:p>
             <a:fld id="{ED99817C-485A-4F31-99A2-8B379398FC65}" type="slidenum">
               <a:rPr lang="nl-NL" smtClean="0"/>
-              <a:t>‹nr.›</a:t>
+              <a:t>‹#›</a:t>
             </a:fld>
             <a:endParaRPr lang="nl-NL"/>
           </a:p>
@@ -1368,7 +1369,7 @@
           <a:p>
             <a:fld id="{00AA4164-34D5-4452-8196-C085709679C2}" type="datetimeFigureOut">
               <a:rPr lang="nl-NL" smtClean="0"/>
-              <a:t>18-1-2021</a:t>
+              <a:t>20-1-2021</a:t>
             </a:fld>
             <a:endParaRPr lang="nl-NL"/>
           </a:p>
@@ -1410,7 +1411,7 @@
           <a:p>
             <a:fld id="{ED99817C-485A-4F31-99A2-8B379398FC65}" type="slidenum">
               <a:rPr lang="nl-NL" smtClean="0"/>
-              <a:t>‹nr.›</a:t>
+              <a:t>‹#›</a:t>
             </a:fld>
             <a:endParaRPr lang="nl-NL"/>
           </a:p>
@@ -1618,7 +1619,7 @@
           <a:p>
             <a:fld id="{00AA4164-34D5-4452-8196-C085709679C2}" type="datetimeFigureOut">
               <a:rPr lang="nl-NL" smtClean="0"/>
-              <a:t>18-1-2021</a:t>
+              <a:t>20-1-2021</a:t>
             </a:fld>
             <a:endParaRPr lang="nl-NL"/>
           </a:p>
@@ -1660,7 +1661,7 @@
           <a:p>
             <a:fld id="{ED99817C-485A-4F31-99A2-8B379398FC65}" type="slidenum">
               <a:rPr lang="nl-NL" smtClean="0"/>
-              <a:t>‹nr.›</a:t>
+              <a:t>‹#›</a:t>
             </a:fld>
             <a:endParaRPr lang="nl-NL"/>
           </a:p>
@@ -1926,7 +1927,7 @@
           <a:p>
             <a:fld id="{00AA4164-34D5-4452-8196-C085709679C2}" type="datetimeFigureOut">
               <a:rPr lang="nl-NL" smtClean="0"/>
-              <a:t>18-1-2021</a:t>
+              <a:t>20-1-2021</a:t>
             </a:fld>
             <a:endParaRPr lang="nl-NL"/>
           </a:p>
@@ -1968,7 +1969,7 @@
           <a:p>
             <a:fld id="{ED99817C-485A-4F31-99A2-8B379398FC65}" type="slidenum">
               <a:rPr lang="nl-NL" smtClean="0"/>
-              <a:t>‹nr.›</a:t>
+              <a:t>‹#›</a:t>
             </a:fld>
             <a:endParaRPr lang="nl-NL"/>
           </a:p>
@@ -2244,7 +2245,7 @@
           <a:p>
             <a:fld id="{00AA4164-34D5-4452-8196-C085709679C2}" type="datetimeFigureOut">
               <a:rPr lang="nl-NL" smtClean="0"/>
-              <a:t>18-1-2021</a:t>
+              <a:t>20-1-2021</a:t>
             </a:fld>
             <a:endParaRPr lang="nl-NL"/>
           </a:p>
@@ -2286,7 +2287,7 @@
           <a:p>
             <a:fld id="{ED99817C-485A-4F31-99A2-8B379398FC65}" type="slidenum">
               <a:rPr lang="nl-NL" smtClean="0"/>
-              <a:t>‹nr.›</a:t>
+              <a:t>‹#›</a:t>
             </a:fld>
             <a:endParaRPr lang="nl-NL"/>
           </a:p>
@@ -2546,7 +2547,7 @@
           <a:p>
             <a:fld id="{00AA4164-34D5-4452-8196-C085709679C2}" type="datetimeFigureOut">
               <a:rPr lang="nl-NL" smtClean="0"/>
-              <a:t>18-1-2021</a:t>
+              <a:t>20-1-2021</a:t>
             </a:fld>
             <a:endParaRPr lang="nl-NL"/>
           </a:p>
@@ -2588,7 +2589,7 @@
           <a:p>
             <a:fld id="{ED99817C-485A-4F31-99A2-8B379398FC65}" type="slidenum">
               <a:rPr lang="nl-NL" smtClean="0"/>
-              <a:t>‹nr.›</a:t>
+              <a:t>‹#›</a:t>
             </a:fld>
             <a:endParaRPr lang="nl-NL"/>
           </a:p>
@@ -2913,7 +2914,7 @@
           <a:p>
             <a:fld id="{00AA4164-34D5-4452-8196-C085709679C2}" type="datetimeFigureOut">
               <a:rPr lang="nl-NL" smtClean="0"/>
-              <a:t>18-1-2021</a:t>
+              <a:t>20-1-2021</a:t>
             </a:fld>
             <a:endParaRPr lang="nl-NL"/>
           </a:p>
@@ -2955,7 +2956,7 @@
           <a:p>
             <a:fld id="{ED99817C-485A-4F31-99A2-8B379398FC65}" type="slidenum">
               <a:rPr lang="nl-NL" smtClean="0"/>
-              <a:t>‹nr.›</a:t>
+              <a:t>‹#›</a:t>
             </a:fld>
             <a:endParaRPr lang="nl-NL"/>
           </a:p>
@@ -3087,7 +3088,7 @@
           <a:p>
             <a:fld id="{00AA4164-34D5-4452-8196-C085709679C2}" type="datetimeFigureOut">
               <a:rPr lang="nl-NL" smtClean="0"/>
-              <a:t>18-1-2021</a:t>
+              <a:t>20-1-2021</a:t>
             </a:fld>
             <a:endParaRPr lang="nl-NL"/>
           </a:p>
@@ -3129,7 +3130,7 @@
           <a:p>
             <a:fld id="{ED99817C-485A-4F31-99A2-8B379398FC65}" type="slidenum">
               <a:rPr lang="nl-NL" smtClean="0"/>
-              <a:t>‹nr.›</a:t>
+              <a:t>‹#›</a:t>
             </a:fld>
             <a:endParaRPr lang="nl-NL"/>
           </a:p>
@@ -3267,7 +3268,7 @@
           <a:p>
             <a:fld id="{00AA4164-34D5-4452-8196-C085709679C2}" type="datetimeFigureOut">
               <a:rPr lang="nl-NL" smtClean="0"/>
-              <a:t>18-1-2021</a:t>
+              <a:t>20-1-2021</a:t>
             </a:fld>
             <a:endParaRPr lang="nl-NL"/>
           </a:p>
@@ -3309,7 +3310,7 @@
           <a:p>
             <a:fld id="{ED99817C-485A-4F31-99A2-8B379398FC65}" type="slidenum">
               <a:rPr lang="nl-NL" smtClean="0"/>
-              <a:t>‹nr.›</a:t>
+              <a:t>‹#›</a:t>
             </a:fld>
             <a:endParaRPr lang="nl-NL"/>
           </a:p>
@@ -3437,7 +3438,7 @@
           <a:p>
             <a:fld id="{00AA4164-34D5-4452-8196-C085709679C2}" type="datetimeFigureOut">
               <a:rPr lang="nl-NL" smtClean="0"/>
-              <a:t>18-1-2021</a:t>
+              <a:t>20-1-2021</a:t>
             </a:fld>
             <a:endParaRPr lang="nl-NL"/>
           </a:p>
@@ -3479,7 +3480,7 @@
           <a:p>
             <a:fld id="{ED99817C-485A-4F31-99A2-8B379398FC65}" type="slidenum">
               <a:rPr lang="nl-NL" smtClean="0"/>
-              <a:t>‹nr.›</a:t>
+              <a:t>‹#›</a:t>
             </a:fld>
             <a:endParaRPr lang="nl-NL"/>
           </a:p>
@@ -3687,7 +3688,7 @@
           <a:p>
             <a:fld id="{00AA4164-34D5-4452-8196-C085709679C2}" type="datetimeFigureOut">
               <a:rPr lang="nl-NL" smtClean="0"/>
-              <a:t>18-1-2021</a:t>
+              <a:t>20-1-2021</a:t>
             </a:fld>
             <a:endParaRPr lang="nl-NL"/>
           </a:p>
@@ -3729,7 +3730,7 @@
           <a:p>
             <a:fld id="{ED99817C-485A-4F31-99A2-8B379398FC65}" type="slidenum">
               <a:rPr lang="nl-NL" smtClean="0"/>
-              <a:t>‹nr.›</a:t>
+              <a:t>‹#›</a:t>
             </a:fld>
             <a:endParaRPr lang="nl-NL"/>
           </a:p>
@@ -3923,7 +3924,7 @@
           <a:p>
             <a:fld id="{00AA4164-34D5-4452-8196-C085709679C2}" type="datetimeFigureOut">
               <a:rPr lang="nl-NL" smtClean="0"/>
-              <a:t>18-1-2021</a:t>
+              <a:t>20-1-2021</a:t>
             </a:fld>
             <a:endParaRPr lang="nl-NL"/>
           </a:p>
@@ -3965,7 +3966,7 @@
           <a:p>
             <a:fld id="{ED99817C-485A-4F31-99A2-8B379398FC65}" type="slidenum">
               <a:rPr lang="nl-NL" smtClean="0"/>
-              <a:t>‹nr.›</a:t>
+              <a:t>‹#›</a:t>
             </a:fld>
             <a:endParaRPr lang="nl-NL"/>
           </a:p>
@@ -4305,7 +4306,7 @@
           <a:p>
             <a:fld id="{00AA4164-34D5-4452-8196-C085709679C2}" type="datetimeFigureOut">
               <a:rPr lang="nl-NL" smtClean="0"/>
-              <a:t>18-1-2021</a:t>
+              <a:t>20-1-2021</a:t>
             </a:fld>
             <a:endParaRPr lang="nl-NL"/>
           </a:p>
@@ -4347,7 +4348,7 @@
           <a:p>
             <a:fld id="{ED99817C-485A-4F31-99A2-8B379398FC65}" type="slidenum">
               <a:rPr lang="nl-NL" smtClean="0"/>
-              <a:t>‹nr.›</a:t>
+              <a:t>‹#›</a:t>
             </a:fld>
             <a:endParaRPr lang="nl-NL"/>
           </a:p>
@@ -4423,7 +4424,7 @@
           <a:p>
             <a:fld id="{00AA4164-34D5-4452-8196-C085709679C2}" type="datetimeFigureOut">
               <a:rPr lang="nl-NL" smtClean="0"/>
-              <a:t>18-1-2021</a:t>
+              <a:t>20-1-2021</a:t>
             </a:fld>
             <a:endParaRPr lang="nl-NL"/>
           </a:p>
@@ -4465,7 +4466,7 @@
           <a:p>
             <a:fld id="{ED99817C-485A-4F31-99A2-8B379398FC65}" type="slidenum">
               <a:rPr lang="nl-NL" smtClean="0"/>
-              <a:t>‹nr.›</a:t>
+              <a:t>‹#›</a:t>
             </a:fld>
             <a:endParaRPr lang="nl-NL"/>
           </a:p>
@@ -4518,7 +4519,7 @@
           <a:p>
             <a:fld id="{00AA4164-34D5-4452-8196-C085709679C2}" type="datetimeFigureOut">
               <a:rPr lang="nl-NL" smtClean="0"/>
-              <a:t>18-1-2021</a:t>
+              <a:t>20-1-2021</a:t>
             </a:fld>
             <a:endParaRPr lang="nl-NL"/>
           </a:p>
@@ -4560,7 +4561,7 @@
           <a:p>
             <a:fld id="{ED99817C-485A-4F31-99A2-8B379398FC65}" type="slidenum">
               <a:rPr lang="nl-NL" smtClean="0"/>
-              <a:t>‹nr.›</a:t>
+              <a:t>‹#›</a:t>
             </a:fld>
             <a:endParaRPr lang="nl-NL"/>
           </a:p>
@@ -4773,7 +4774,7 @@
           <a:p>
             <a:fld id="{00AA4164-34D5-4452-8196-C085709679C2}" type="datetimeFigureOut">
               <a:rPr lang="nl-NL" smtClean="0"/>
-              <a:t>18-1-2021</a:t>
+              <a:t>20-1-2021</a:t>
             </a:fld>
             <a:endParaRPr lang="nl-NL"/>
           </a:p>
@@ -4815,7 +4816,7 @@
           <a:p>
             <a:fld id="{ED99817C-485A-4F31-99A2-8B379398FC65}" type="slidenum">
               <a:rPr lang="nl-NL" smtClean="0"/>
-              <a:t>‹nr.›</a:t>
+              <a:t>‹#›</a:t>
             </a:fld>
             <a:endParaRPr lang="nl-NL"/>
           </a:p>
@@ -5056,7 +5057,7 @@
           <a:p>
             <a:fld id="{00AA4164-34D5-4452-8196-C085709679C2}" type="datetimeFigureOut">
               <a:rPr lang="nl-NL" smtClean="0"/>
-              <a:t>18-1-2021</a:t>
+              <a:t>20-1-2021</a:t>
             </a:fld>
             <a:endParaRPr lang="nl-NL"/>
           </a:p>
@@ -5098,7 +5099,7 @@
           <a:p>
             <a:fld id="{ED99817C-485A-4F31-99A2-8B379398FC65}" type="slidenum">
               <a:rPr lang="nl-NL" smtClean="0"/>
-              <a:t>‹nr.›</a:t>
+              <a:t>‹#›</a:t>
             </a:fld>
             <a:endParaRPr lang="nl-NL"/>
           </a:p>
@@ -5462,7 +5463,7 @@
           <a:p>
             <a:fld id="{00AA4164-34D5-4452-8196-C085709679C2}" type="datetimeFigureOut">
               <a:rPr lang="nl-NL" smtClean="0"/>
-              <a:t>18-1-2021</a:t>
+              <a:t>20-1-2021</a:t>
             </a:fld>
             <a:endParaRPr lang="nl-NL"/>
           </a:p>
@@ -5544,7 +5545,7 @@
           <a:p>
             <a:fld id="{ED99817C-485A-4F31-99A2-8B379398FC65}" type="slidenum">
               <a:rPr lang="nl-NL" smtClean="0"/>
-              <a:t>‹nr.›</a:t>
+              <a:t>‹#›</a:t>
             </a:fld>
             <a:endParaRPr lang="nl-NL"/>
           </a:p>
@@ -6214,7 +6215,7 @@
           </a:bodyPr>
           <a:lstStyle/>
           <a:p>
-            <a:endParaRPr lang="nl-NL">
+            <a:endParaRPr lang="nl-NL" dirty="0">
               <a:solidFill>
                 <a:schemeClr val="tx1">
                   <a:alpha val="80000"/>
@@ -9595,6 +9596,831 @@
     <p:extLst>
       <p:ext uri="{BB962C8B-B14F-4D97-AF65-F5344CB8AC3E}">
         <p14:creationId xmlns:p14="http://schemas.microsoft.com/office/powerpoint/2010/main" val="1249222413"/>
+      </p:ext>
+    </p:extLst>
+  </p:cSld>
+  <p:clrMapOvr>
+    <a:masterClrMapping/>
+  </p:clrMapOvr>
+</p:sld>
+</file>
+
+<file path=ppt/slides/slide8.xml><?xml version="1.0" encoding="utf-8"?>
+<p:sld xmlns:a="http://schemas.openxmlformats.org/drawingml/2006/main" xmlns:r="http://schemas.openxmlformats.org/officeDocument/2006/relationships" xmlns:p="http://schemas.openxmlformats.org/presentationml/2006/main">
+  <p:cSld>
+    <p:bg>
+      <p:bgPr>
+        <a:solidFill>
+          <a:schemeClr val="bg2"/>
+        </a:solidFill>
+        <a:effectLst/>
+      </p:bgPr>
+    </p:bg>
+    <p:spTree>
+      <p:nvGrpSpPr>
+        <p:cNvPr id="1" name=""/>
+        <p:cNvGrpSpPr/>
+        <p:nvPr/>
+      </p:nvGrpSpPr>
+      <p:grpSpPr>
+        <a:xfrm>
+          <a:off x="0" y="0"/>
+          <a:ext cx="0" cy="0"/>
+          <a:chOff x="0" y="0"/>
+          <a:chExt cx="0" cy="0"/>
+        </a:xfrm>
+      </p:grpSpPr>
+      <p:cxnSp>
+        <p:nvCxnSpPr>
+          <p:cNvPr id="8" name="Straight Connector 7">
+            <a:extLst>
+              <a:ext uri="{FF2B5EF4-FFF2-40B4-BE49-F238E27FC236}">
+                <a16:creationId xmlns:a16="http://schemas.microsoft.com/office/drawing/2014/main" id="{FEB90296-CFE0-401D-9CA3-32966EC4F01D}"/>
+              </a:ext>
+              <a:ext uri="{C183D7F6-B498-43B3-948B-1728B52AA6E4}">
+                <adec:decorative xmlns:adec="http://schemas.microsoft.com/office/drawing/2017/decorative" val="1"/>
+              </a:ext>
+            </a:extLst>
+          </p:cNvPr>
+          <p:cNvCxnSpPr>
+            <a:cxnSpLocks noGrp="1" noRot="1" noChangeAspect="1" noMove="1" noResize="1" noEditPoints="1" noAdjustHandles="1" noChangeArrowheads="1" noChangeShapeType="1"/>
+          </p:cNvCxnSpPr>
+          <p:nvPr>
+            <p:extLst>
+              <p:ext uri="{386F3935-93C4-4BCD-93E2-E3B085C9AB24}">
+                <p16:designElem xmlns:p16="http://schemas.microsoft.com/office/powerpoint/2015/main" val="1"/>
+              </p:ext>
+            </p:extLst>
+          </p:nvPr>
+        </p:nvCxnSpPr>
+        <p:spPr>
+          <a:xfrm flipH="1">
+            <a:off x="8228012" y="8467"/>
+            <a:ext cx="3810000" cy="3810000"/>
+          </a:xfrm>
+          <a:prstGeom prst="line">
+            <a:avLst/>
+          </a:prstGeom>
+          <a:ln w="12700">
+            <a:solidFill>
+              <a:schemeClr val="tx1"/>
+            </a:solidFill>
+          </a:ln>
+        </p:spPr>
+        <p:style>
+          <a:lnRef idx="2">
+            <a:schemeClr val="accent1"/>
+          </a:lnRef>
+          <a:fillRef idx="0">
+            <a:schemeClr val="accent1"/>
+          </a:fillRef>
+          <a:effectRef idx="1">
+            <a:schemeClr val="accent1"/>
+          </a:effectRef>
+          <a:fontRef idx="minor">
+            <a:schemeClr val="tx1"/>
+          </a:fontRef>
+        </p:style>
+      </p:cxnSp>
+      <p:cxnSp>
+        <p:nvCxnSpPr>
+          <p:cNvPr id="10" name="Straight Connector 9">
+            <a:extLst>
+              <a:ext uri="{FF2B5EF4-FFF2-40B4-BE49-F238E27FC236}">
+                <a16:creationId xmlns:a16="http://schemas.microsoft.com/office/drawing/2014/main" id="{08C9B4EE-7611-4ED9-B356-7BDD377C39B0}"/>
+              </a:ext>
+              <a:ext uri="{C183D7F6-B498-43B3-948B-1728B52AA6E4}">
+                <adec:decorative xmlns:adec="http://schemas.microsoft.com/office/drawing/2017/decorative" val="1"/>
+              </a:ext>
+            </a:extLst>
+          </p:cNvPr>
+          <p:cNvCxnSpPr>
+            <a:cxnSpLocks noGrp="1" noRot="1" noChangeAspect="1" noMove="1" noResize="1" noEditPoints="1" noAdjustHandles="1" noChangeArrowheads="1" noChangeShapeType="1"/>
+          </p:cNvCxnSpPr>
+          <p:nvPr>
+            <p:extLst>
+              <p:ext uri="{386F3935-93C4-4BCD-93E2-E3B085C9AB24}">
+                <p16:designElem xmlns:p16="http://schemas.microsoft.com/office/powerpoint/2015/main" val="1"/>
+              </p:ext>
+            </p:extLst>
+          </p:nvPr>
+        </p:nvCxnSpPr>
+        <p:spPr>
+          <a:xfrm flipH="1">
+            <a:off x="6108170" y="91545"/>
+            <a:ext cx="6080655" cy="6080655"/>
+          </a:xfrm>
+          <a:prstGeom prst="line">
+            <a:avLst/>
+          </a:prstGeom>
+          <a:ln w="12700">
+            <a:solidFill>
+              <a:schemeClr val="tx1"/>
+            </a:solidFill>
+          </a:ln>
+        </p:spPr>
+        <p:style>
+          <a:lnRef idx="2">
+            <a:schemeClr val="accent1"/>
+          </a:lnRef>
+          <a:fillRef idx="0">
+            <a:schemeClr val="accent1"/>
+          </a:fillRef>
+          <a:effectRef idx="1">
+            <a:schemeClr val="accent1"/>
+          </a:effectRef>
+          <a:fontRef idx="minor">
+            <a:schemeClr val="tx1"/>
+          </a:fontRef>
+        </p:style>
+      </p:cxnSp>
+      <p:cxnSp>
+        <p:nvCxnSpPr>
+          <p:cNvPr id="12" name="Straight Connector 11">
+            <a:extLst>
+              <a:ext uri="{FF2B5EF4-FFF2-40B4-BE49-F238E27FC236}">
+                <a16:creationId xmlns:a16="http://schemas.microsoft.com/office/drawing/2014/main" id="{4A4F266A-F2F7-47CD-8BBC-E3777E982FD2}"/>
+              </a:ext>
+              <a:ext uri="{C183D7F6-B498-43B3-948B-1728B52AA6E4}">
+                <adec:decorative xmlns:adec="http://schemas.microsoft.com/office/drawing/2017/decorative" val="1"/>
+              </a:ext>
+            </a:extLst>
+          </p:cNvPr>
+          <p:cNvCxnSpPr>
+            <a:cxnSpLocks noGrp="1" noRot="1" noChangeAspect="1" noMove="1" noResize="1" noEditPoints="1" noAdjustHandles="1" noChangeArrowheads="1" noChangeShapeType="1"/>
+          </p:cNvCxnSpPr>
+          <p:nvPr>
+            <p:extLst>
+              <p:ext uri="{386F3935-93C4-4BCD-93E2-E3B085C9AB24}">
+                <p16:designElem xmlns:p16="http://schemas.microsoft.com/office/powerpoint/2015/main" val="1"/>
+              </p:ext>
+            </p:extLst>
+          </p:nvPr>
+        </p:nvCxnSpPr>
+        <p:spPr>
+          <a:xfrm flipH="1">
+            <a:off x="7235825" y="228600"/>
+            <a:ext cx="4953000" cy="4953000"/>
+          </a:xfrm>
+          <a:prstGeom prst="line">
+            <a:avLst/>
+          </a:prstGeom>
+          <a:ln w="12700">
+            <a:solidFill>
+              <a:schemeClr val="tx1"/>
+            </a:solidFill>
+          </a:ln>
+        </p:spPr>
+        <p:style>
+          <a:lnRef idx="2">
+            <a:schemeClr val="accent1"/>
+          </a:lnRef>
+          <a:fillRef idx="0">
+            <a:schemeClr val="accent1"/>
+          </a:fillRef>
+          <a:effectRef idx="1">
+            <a:schemeClr val="accent1"/>
+          </a:effectRef>
+          <a:fontRef idx="minor">
+            <a:schemeClr val="tx1"/>
+          </a:fontRef>
+        </p:style>
+      </p:cxnSp>
+      <p:cxnSp>
+        <p:nvCxnSpPr>
+          <p:cNvPr id="14" name="Straight Connector 13">
+            <a:extLst>
+              <a:ext uri="{FF2B5EF4-FFF2-40B4-BE49-F238E27FC236}">
+                <a16:creationId xmlns:a16="http://schemas.microsoft.com/office/drawing/2014/main" id="{20D69C80-8919-4A32-B897-F2A21F940574}"/>
+              </a:ext>
+              <a:ext uri="{C183D7F6-B498-43B3-948B-1728B52AA6E4}">
+                <adec:decorative xmlns:adec="http://schemas.microsoft.com/office/drawing/2017/decorative" val="1"/>
+              </a:ext>
+            </a:extLst>
+          </p:cNvPr>
+          <p:cNvCxnSpPr>
+            <a:cxnSpLocks noGrp="1" noRot="1" noChangeAspect="1" noMove="1" noResize="1" noEditPoints="1" noAdjustHandles="1" noChangeArrowheads="1" noChangeShapeType="1"/>
+          </p:cNvCxnSpPr>
+          <p:nvPr>
+            <p:extLst>
+              <p:ext uri="{386F3935-93C4-4BCD-93E2-E3B085C9AB24}">
+                <p16:designElem xmlns:p16="http://schemas.microsoft.com/office/powerpoint/2015/main" val="1"/>
+              </p:ext>
+            </p:extLst>
+          </p:nvPr>
+        </p:nvCxnSpPr>
+        <p:spPr>
+          <a:xfrm flipH="1">
+            <a:off x="7335837" y="32278"/>
+            <a:ext cx="4852989" cy="4852989"/>
+          </a:xfrm>
+          <a:prstGeom prst="line">
+            <a:avLst/>
+          </a:prstGeom>
+          <a:ln w="31750">
+            <a:solidFill>
+              <a:schemeClr val="tx1"/>
+            </a:solidFill>
+          </a:ln>
+        </p:spPr>
+        <p:style>
+          <a:lnRef idx="2">
+            <a:schemeClr val="accent1"/>
+          </a:lnRef>
+          <a:fillRef idx="0">
+            <a:schemeClr val="accent1"/>
+          </a:fillRef>
+          <a:effectRef idx="1">
+            <a:schemeClr val="accent1"/>
+          </a:effectRef>
+          <a:fontRef idx="minor">
+            <a:schemeClr val="tx1"/>
+          </a:fontRef>
+        </p:style>
+      </p:cxnSp>
+      <p:cxnSp>
+        <p:nvCxnSpPr>
+          <p:cNvPr id="16" name="Straight Connector 15">
+            <a:extLst>
+              <a:ext uri="{FF2B5EF4-FFF2-40B4-BE49-F238E27FC236}">
+                <a16:creationId xmlns:a16="http://schemas.microsoft.com/office/drawing/2014/main" id="{F427B072-CC5B-481B-9719-8CD4C54444BE}"/>
+              </a:ext>
+              <a:ext uri="{C183D7F6-B498-43B3-948B-1728B52AA6E4}">
+                <adec:decorative xmlns:adec="http://schemas.microsoft.com/office/drawing/2017/decorative" val="1"/>
+              </a:ext>
+            </a:extLst>
+          </p:cNvPr>
+          <p:cNvCxnSpPr>
+            <a:cxnSpLocks noGrp="1" noRot="1" noChangeAspect="1" noMove="1" noResize="1" noEditPoints="1" noAdjustHandles="1" noChangeArrowheads="1" noChangeShapeType="1"/>
+          </p:cNvCxnSpPr>
+          <p:nvPr>
+            <p:extLst>
+              <p:ext uri="{386F3935-93C4-4BCD-93E2-E3B085C9AB24}">
+                <p16:designElem xmlns:p16="http://schemas.microsoft.com/office/powerpoint/2015/main" val="1"/>
+              </p:ext>
+            </p:extLst>
+          </p:nvPr>
+        </p:nvCxnSpPr>
+        <p:spPr>
+          <a:xfrm flipH="1">
+            <a:off x="7845426" y="609601"/>
+            <a:ext cx="4343399" cy="4343399"/>
+          </a:xfrm>
+          <a:prstGeom prst="line">
+            <a:avLst/>
+          </a:prstGeom>
+          <a:ln w="31750">
+            <a:solidFill>
+              <a:schemeClr val="tx1"/>
+            </a:solidFill>
+          </a:ln>
+        </p:spPr>
+        <p:style>
+          <a:lnRef idx="2">
+            <a:schemeClr val="accent1"/>
+          </a:lnRef>
+          <a:fillRef idx="0">
+            <a:schemeClr val="accent1"/>
+          </a:fillRef>
+          <a:effectRef idx="1">
+            <a:schemeClr val="accent1"/>
+          </a:effectRef>
+          <a:fontRef idx="minor">
+            <a:schemeClr val="tx1"/>
+          </a:fontRef>
+        </p:style>
+      </p:cxnSp>
+      <p:sp useBgFill="1">
+        <p:nvSpPr>
+          <p:cNvPr id="18" name="Rectangle 17">
+            <a:extLst>
+              <a:ext uri="{FF2B5EF4-FFF2-40B4-BE49-F238E27FC236}">
+                <a16:creationId xmlns:a16="http://schemas.microsoft.com/office/drawing/2014/main" id="{313BE87B-D7FD-4BF3-A7BC-511F522528C2}"/>
+              </a:ext>
+              <a:ext uri="{C183D7F6-B498-43B3-948B-1728B52AA6E4}">
+                <adec:decorative xmlns:adec="http://schemas.microsoft.com/office/drawing/2017/decorative" val="1"/>
+              </a:ext>
+            </a:extLst>
+          </p:cNvPr>
+          <p:cNvSpPr>
+            <a:spLocks noGrp="1" noRot="1" noChangeAspect="1" noMove="1" noResize="1" noEditPoints="1" noAdjustHandles="1" noChangeArrowheads="1" noChangeShapeType="1" noTextEdit="1"/>
+          </p:cNvSpPr>
+          <p:nvPr>
+            <p:extLst>
+              <p:ext uri="{386F3935-93C4-4BCD-93E2-E3B085C9AB24}">
+                <p16:designElem xmlns:p16="http://schemas.microsoft.com/office/powerpoint/2015/main" val="1"/>
+              </p:ext>
+            </p:extLst>
+          </p:nvPr>
+        </p:nvSpPr>
+        <p:spPr>
+          <a:xfrm>
+            <a:off x="0" y="0"/>
+            <a:ext cx="12192000" cy="6858000"/>
+          </a:xfrm>
+          <a:prstGeom prst="rect">
+            <a:avLst/>
+          </a:prstGeom>
+          <a:solidFill>
+            <a:schemeClr val="accent1"/>
+          </a:solidFill>
+          <a:ln>
+            <a:noFill/>
+          </a:ln>
+        </p:spPr>
+        <p:style>
+          <a:lnRef idx="2">
+            <a:schemeClr val="accent1">
+              <a:shade val="50000"/>
+            </a:schemeClr>
+          </a:lnRef>
+          <a:fillRef idx="1">
+            <a:schemeClr val="accent1"/>
+          </a:fillRef>
+          <a:effectRef idx="0">
+            <a:schemeClr val="accent1"/>
+          </a:effectRef>
+          <a:fontRef idx="minor">
+            <a:schemeClr val="lt1"/>
+          </a:fontRef>
+        </p:style>
+        <p:txBody>
+          <a:bodyPr rtlCol="0" anchor="ctr"/>
+          <a:lstStyle/>
+          <a:p>
+            <a:pPr algn="ctr"/>
+            <a:endParaRPr lang="en-US"/>
+          </a:p>
+        </p:txBody>
+      </p:sp>
+      <p:sp>
+        <p:nvSpPr>
+          <p:cNvPr id="20" name="Rectangle 19">
+            <a:extLst>
+              <a:ext uri="{FF2B5EF4-FFF2-40B4-BE49-F238E27FC236}">
+                <a16:creationId xmlns:a16="http://schemas.microsoft.com/office/drawing/2014/main" id="{035A481B-C639-4892-B0EF-4D8373A9B06A}"/>
+              </a:ext>
+              <a:ext uri="{C183D7F6-B498-43B3-948B-1728B52AA6E4}">
+                <adec:decorative xmlns:adec="http://schemas.microsoft.com/office/drawing/2017/decorative" val="1"/>
+              </a:ext>
+            </a:extLst>
+          </p:cNvPr>
+          <p:cNvSpPr>
+            <a:spLocks noGrp="1" noRot="1" noChangeAspect="1" noMove="1" noResize="1" noEditPoints="1" noAdjustHandles="1" noChangeArrowheads="1" noChangeShapeType="1" noTextEdit="1"/>
+          </p:cNvSpPr>
+          <p:nvPr>
+            <p:extLst>
+              <p:ext uri="{386F3935-93C4-4BCD-93E2-E3B085C9AB24}">
+                <p16:designElem xmlns:p16="http://schemas.microsoft.com/office/powerpoint/2015/main" val="1"/>
+              </p:ext>
+            </p:extLst>
+          </p:nvPr>
+        </p:nvSpPr>
+        <p:spPr>
+          <a:xfrm>
+            <a:off x="0" y="-1"/>
+            <a:ext cx="4639734" cy="6858000"/>
+          </a:xfrm>
+          <a:prstGeom prst="rect">
+            <a:avLst/>
+          </a:prstGeom>
+          <a:solidFill>
+            <a:schemeClr val="accent1">
+              <a:lumMod val="75000"/>
+            </a:schemeClr>
+          </a:solidFill>
+          <a:ln>
+            <a:noFill/>
+          </a:ln>
+          <a:effectLst/>
+        </p:spPr>
+        <p:style>
+          <a:lnRef idx="2">
+            <a:schemeClr val="accent1">
+              <a:shade val="50000"/>
+            </a:schemeClr>
+          </a:lnRef>
+          <a:fillRef idx="1001">
+            <a:schemeClr val="dk2"/>
+          </a:fillRef>
+          <a:effectRef idx="0">
+            <a:schemeClr val="accent1"/>
+          </a:effectRef>
+          <a:fontRef idx="minor">
+            <a:schemeClr val="lt1"/>
+          </a:fontRef>
+        </p:style>
+        <p:txBody>
+          <a:bodyPr rtlCol="0" anchor="ctr"/>
+          <a:lstStyle/>
+          <a:p>
+            <a:pPr algn="ctr"/>
+            <a:endParaRPr lang="en-US"/>
+          </a:p>
+        </p:txBody>
+      </p:sp>
+      <p:sp>
+        <p:nvSpPr>
+          <p:cNvPr id="22" name="Rectangle 21">
+            <a:extLst>
+              <a:ext uri="{FF2B5EF4-FFF2-40B4-BE49-F238E27FC236}">
+                <a16:creationId xmlns:a16="http://schemas.microsoft.com/office/drawing/2014/main" id="{052BD58B-6284-459E-9FF4-A97F3A569074}"/>
+              </a:ext>
+              <a:ext uri="{C183D7F6-B498-43B3-948B-1728B52AA6E4}">
+                <adec:decorative xmlns:adec="http://schemas.microsoft.com/office/drawing/2017/decorative" val="1"/>
+              </a:ext>
+            </a:extLst>
+          </p:cNvPr>
+          <p:cNvSpPr>
+            <a:spLocks noGrp="1" noRot="1" noChangeAspect="1" noMove="1" noResize="1" noEditPoints="1" noAdjustHandles="1" noChangeArrowheads="1" noChangeShapeType="1" noTextEdit="1"/>
+          </p:cNvSpPr>
+          <p:nvPr>
+            <p:extLst>
+              <p:ext uri="{386F3935-93C4-4BCD-93E2-E3B085C9AB24}">
+                <p16:designElem xmlns:p16="http://schemas.microsoft.com/office/powerpoint/2015/main" val="1"/>
+              </p:ext>
+            </p:extLst>
+          </p:nvPr>
+        </p:nvSpPr>
+        <p:spPr>
+          <a:xfrm>
+            <a:off x="0" y="-2"/>
+            <a:ext cx="1438656" cy="6858000"/>
+          </a:xfrm>
+          <a:prstGeom prst="rect">
+            <a:avLst/>
+          </a:prstGeom>
+          <a:solidFill>
+            <a:schemeClr val="accent1">
+              <a:lumMod val="50000"/>
+            </a:schemeClr>
+          </a:solidFill>
+          <a:ln>
+            <a:noFill/>
+          </a:ln>
+        </p:spPr>
+        <p:style>
+          <a:lnRef idx="2">
+            <a:schemeClr val="accent1">
+              <a:shade val="50000"/>
+            </a:schemeClr>
+          </a:lnRef>
+          <a:fillRef idx="1003">
+            <a:schemeClr val="lt1"/>
+          </a:fillRef>
+          <a:effectRef idx="0">
+            <a:schemeClr val="accent1"/>
+          </a:effectRef>
+          <a:fontRef idx="minor">
+            <a:schemeClr val="lt1"/>
+          </a:fontRef>
+        </p:style>
+        <p:txBody>
+          <a:bodyPr rtlCol="0" anchor="ctr"/>
+          <a:lstStyle/>
+          <a:p>
+            <a:pPr algn="ctr"/>
+            <a:endParaRPr lang="en-US">
+              <a:solidFill>
+                <a:schemeClr val="accent2"/>
+              </a:solidFill>
+            </a:endParaRPr>
+          </a:p>
+        </p:txBody>
+      </p:sp>
+      <p:grpSp>
+        <p:nvGrpSpPr>
+          <p:cNvPr id="24" name="Group 23">
+            <a:extLst>
+              <a:ext uri="{FF2B5EF4-FFF2-40B4-BE49-F238E27FC236}">
+                <a16:creationId xmlns:a16="http://schemas.microsoft.com/office/drawing/2014/main" id="{AE589C21-CEDE-4D90-AC85-6E43B68D1316}"/>
+              </a:ext>
+              <a:ext uri="{C183D7F6-B498-43B3-948B-1728B52AA6E4}">
+                <adec:decorative xmlns:adec="http://schemas.microsoft.com/office/drawing/2017/decorative" val="1"/>
+              </a:ext>
+            </a:extLst>
+          </p:cNvPr>
+          <p:cNvGrpSpPr>
+            <a:grpSpLocks noGrp="1" noUngrp="1" noRot="1" noChangeAspect="1" noMove="1" noResize="1"/>
+          </p:cNvGrpSpPr>
+          <p:nvPr>
+            <p:extLst>
+              <p:ext uri="{386F3935-93C4-4BCD-93E2-E3B085C9AB24}">
+                <p16:designElem xmlns:p16="http://schemas.microsoft.com/office/powerpoint/2015/main" val="1"/>
+              </p:ext>
+            </p:extLst>
+          </p:nvPr>
+        </p:nvGrpSpPr>
+        <p:grpSpPr>
+          <a:xfrm>
+            <a:off x="9206969" y="3449715"/>
+            <a:ext cx="2981858" cy="3208867"/>
+            <a:chOff x="9206969" y="2963333"/>
+            <a:chExt cx="2981858" cy="3208867"/>
+          </a:xfrm>
+        </p:grpSpPr>
+        <p:cxnSp>
+          <p:nvCxnSpPr>
+            <p:cNvPr id="25" name="Straight Connector 24">
+              <a:extLst>
+                <a:ext uri="{FF2B5EF4-FFF2-40B4-BE49-F238E27FC236}">
+                  <a16:creationId xmlns:a16="http://schemas.microsoft.com/office/drawing/2014/main" id="{1F4121EC-0ADD-45C0-85F0-D49F67A3ED8B}"/>
+                </a:ext>
+                <a:ext uri="{C183D7F6-B498-43B3-948B-1728B52AA6E4}">
+                  <adec:decorative xmlns:adec="http://schemas.microsoft.com/office/drawing/2017/decorative" val="1"/>
+                </a:ext>
+              </a:extLst>
+            </p:cNvPr>
+            <p:cNvCxnSpPr/>
+            <p:nvPr>
+              <p:extLst>
+                <p:ext uri="{386F3935-93C4-4BCD-93E2-E3B085C9AB24}">
+                  <p16:designElem xmlns:p16="http://schemas.microsoft.com/office/powerpoint/2015/main" val="1"/>
+                </p:ext>
+              </p:extLst>
+            </p:nvPr>
+          </p:nvCxnSpPr>
+          <p:spPr>
+            <a:xfrm flipH="1">
+              <a:off x="11276012" y="2963333"/>
+              <a:ext cx="912814" cy="912812"/>
+            </a:xfrm>
+            <a:prstGeom prst="line">
+              <a:avLst/>
+            </a:prstGeom>
+            <a:ln w="9525">
+              <a:solidFill>
+                <a:srgbClr val="FFFFFF"/>
+              </a:solidFill>
+            </a:ln>
+          </p:spPr>
+          <p:style>
+            <a:lnRef idx="2">
+              <a:schemeClr val="accent1"/>
+            </a:lnRef>
+            <a:fillRef idx="0">
+              <a:schemeClr val="accent1"/>
+            </a:fillRef>
+            <a:effectRef idx="1">
+              <a:schemeClr val="accent1"/>
+            </a:effectRef>
+            <a:fontRef idx="minor">
+              <a:schemeClr val="tx1"/>
+            </a:fontRef>
+          </p:style>
+        </p:cxnSp>
+        <p:cxnSp>
+          <p:nvCxnSpPr>
+            <p:cNvPr id="26" name="Straight Connector 25">
+              <a:extLst>
+                <a:ext uri="{FF2B5EF4-FFF2-40B4-BE49-F238E27FC236}">
+                  <a16:creationId xmlns:a16="http://schemas.microsoft.com/office/drawing/2014/main" id="{422F012F-0680-4AEC-9884-BA712ED2B9E6}"/>
+                </a:ext>
+                <a:ext uri="{C183D7F6-B498-43B3-948B-1728B52AA6E4}">
+                  <adec:decorative xmlns:adec="http://schemas.microsoft.com/office/drawing/2017/decorative" val="1"/>
+                </a:ext>
+              </a:extLst>
+            </p:cNvPr>
+            <p:cNvCxnSpPr/>
+            <p:nvPr>
+              <p:extLst>
+                <p:ext uri="{386F3935-93C4-4BCD-93E2-E3B085C9AB24}">
+                  <p16:designElem xmlns:p16="http://schemas.microsoft.com/office/powerpoint/2015/main" val="1"/>
+                </p:ext>
+              </p:extLst>
+            </p:nvPr>
+          </p:nvCxnSpPr>
+          <p:spPr>
+            <a:xfrm flipH="1">
+              <a:off x="9206969" y="3190344"/>
+              <a:ext cx="2981857" cy="2981856"/>
+            </a:xfrm>
+            <a:prstGeom prst="line">
+              <a:avLst/>
+            </a:prstGeom>
+            <a:ln w="9525">
+              <a:solidFill>
+                <a:srgbClr val="FFFFFF"/>
+              </a:solidFill>
+            </a:ln>
+          </p:spPr>
+          <p:style>
+            <a:lnRef idx="2">
+              <a:schemeClr val="accent1"/>
+            </a:lnRef>
+            <a:fillRef idx="0">
+              <a:schemeClr val="accent1"/>
+            </a:fillRef>
+            <a:effectRef idx="1">
+              <a:schemeClr val="accent1"/>
+            </a:effectRef>
+            <a:fontRef idx="minor">
+              <a:schemeClr val="tx1"/>
+            </a:fontRef>
+          </p:style>
+        </p:cxnSp>
+        <p:cxnSp>
+          <p:nvCxnSpPr>
+            <p:cNvPr id="27" name="Straight Connector 26">
+              <a:extLst>
+                <a:ext uri="{FF2B5EF4-FFF2-40B4-BE49-F238E27FC236}">
+                  <a16:creationId xmlns:a16="http://schemas.microsoft.com/office/drawing/2014/main" id="{FA5CEDFE-9EC8-436B-AE10-F85A847783A2}"/>
+                </a:ext>
+                <a:ext uri="{C183D7F6-B498-43B3-948B-1728B52AA6E4}">
+                  <adec:decorative xmlns:adec="http://schemas.microsoft.com/office/drawing/2017/decorative" val="1"/>
+                </a:ext>
+              </a:extLst>
+            </p:cNvPr>
+            <p:cNvCxnSpPr/>
+            <p:nvPr>
+              <p:extLst>
+                <p:ext uri="{386F3935-93C4-4BCD-93E2-E3B085C9AB24}">
+                  <p16:designElem xmlns:p16="http://schemas.microsoft.com/office/powerpoint/2015/main" val="1"/>
+                </p:ext>
+              </p:extLst>
+            </p:nvPr>
+          </p:nvCxnSpPr>
+          <p:spPr>
+            <a:xfrm flipH="1">
+              <a:off x="10292292" y="3285067"/>
+              <a:ext cx="1896534" cy="1896533"/>
+            </a:xfrm>
+            <a:prstGeom prst="line">
+              <a:avLst/>
+            </a:prstGeom>
+            <a:ln w="9525">
+              <a:solidFill>
+                <a:srgbClr val="FFFFFF"/>
+              </a:solidFill>
+            </a:ln>
+          </p:spPr>
+          <p:style>
+            <a:lnRef idx="2">
+              <a:schemeClr val="accent1"/>
+            </a:lnRef>
+            <a:fillRef idx="0">
+              <a:schemeClr val="accent1"/>
+            </a:fillRef>
+            <a:effectRef idx="1">
+              <a:schemeClr val="accent1"/>
+            </a:effectRef>
+            <a:fontRef idx="minor">
+              <a:schemeClr val="tx1"/>
+            </a:fontRef>
+          </p:style>
+        </p:cxnSp>
+        <p:cxnSp>
+          <p:nvCxnSpPr>
+            <p:cNvPr id="28" name="Straight Connector 27">
+              <a:extLst>
+                <a:ext uri="{FF2B5EF4-FFF2-40B4-BE49-F238E27FC236}">
+                  <a16:creationId xmlns:a16="http://schemas.microsoft.com/office/drawing/2014/main" id="{29C70031-55D8-483B-8452-A6B809D0AC84}"/>
+                </a:ext>
+                <a:ext uri="{C183D7F6-B498-43B3-948B-1728B52AA6E4}">
+                  <adec:decorative xmlns:adec="http://schemas.microsoft.com/office/drawing/2017/decorative" val="1"/>
+                </a:ext>
+              </a:extLst>
+            </p:cNvPr>
+            <p:cNvCxnSpPr/>
+            <p:nvPr>
+              <p:extLst>
+                <p:ext uri="{386F3935-93C4-4BCD-93E2-E3B085C9AB24}">
+                  <p16:designElem xmlns:p16="http://schemas.microsoft.com/office/powerpoint/2015/main" val="1"/>
+                </p:ext>
+              </p:extLst>
+            </p:nvPr>
+          </p:nvCxnSpPr>
+          <p:spPr>
+            <a:xfrm flipH="1">
+              <a:off x="10443103" y="3131080"/>
+              <a:ext cx="1745722" cy="1745720"/>
+            </a:xfrm>
+            <a:prstGeom prst="line">
+              <a:avLst/>
+            </a:prstGeom>
+            <a:ln w="28575">
+              <a:solidFill>
+                <a:srgbClr val="FFFFFF"/>
+              </a:solidFill>
+            </a:ln>
+          </p:spPr>
+          <p:style>
+            <a:lnRef idx="2">
+              <a:schemeClr val="accent1"/>
+            </a:lnRef>
+            <a:fillRef idx="0">
+              <a:schemeClr val="accent1"/>
+            </a:fillRef>
+            <a:effectRef idx="1">
+              <a:schemeClr val="accent1"/>
+            </a:effectRef>
+            <a:fontRef idx="minor">
+              <a:schemeClr val="tx1"/>
+            </a:fontRef>
+          </p:style>
+        </p:cxnSp>
+        <p:cxnSp>
+          <p:nvCxnSpPr>
+            <p:cNvPr id="29" name="Straight Connector 28">
+              <a:extLst>
+                <a:ext uri="{FF2B5EF4-FFF2-40B4-BE49-F238E27FC236}">
+                  <a16:creationId xmlns:a16="http://schemas.microsoft.com/office/drawing/2014/main" id="{E24F1E16-B0BE-4400-9A10-95BB1D52CCD2}"/>
+                </a:ext>
+                <a:ext uri="{C183D7F6-B498-43B3-948B-1728B52AA6E4}">
+                  <adec:decorative xmlns:adec="http://schemas.microsoft.com/office/drawing/2017/decorative" val="1"/>
+                </a:ext>
+              </a:extLst>
+            </p:cNvPr>
+            <p:cNvCxnSpPr/>
+            <p:nvPr>
+              <p:extLst>
+                <p:ext uri="{386F3935-93C4-4BCD-93E2-E3B085C9AB24}">
+                  <p16:designElem xmlns:p16="http://schemas.microsoft.com/office/powerpoint/2015/main" val="1"/>
+                </p:ext>
+              </p:extLst>
+            </p:nvPr>
+          </p:nvCxnSpPr>
+          <p:spPr>
+            <a:xfrm flipH="1">
+              <a:off x="10918826" y="3683001"/>
+              <a:ext cx="1270001" cy="1269999"/>
+            </a:xfrm>
+            <a:prstGeom prst="line">
+              <a:avLst/>
+            </a:prstGeom>
+            <a:ln w="28575">
+              <a:solidFill>
+                <a:srgbClr val="FFFFFF"/>
+              </a:solidFill>
+            </a:ln>
+          </p:spPr>
+          <p:style>
+            <a:lnRef idx="2">
+              <a:schemeClr val="accent1"/>
+            </a:lnRef>
+            <a:fillRef idx="0">
+              <a:schemeClr val="accent1"/>
+            </a:fillRef>
+            <a:effectRef idx="1">
+              <a:schemeClr val="accent1"/>
+            </a:effectRef>
+            <a:fontRef idx="minor">
+              <a:schemeClr val="tx1"/>
+            </a:fontRef>
+          </p:style>
+        </p:cxnSp>
+      </p:grpSp>
+      <p:sp>
+        <p:nvSpPr>
+          <p:cNvPr id="2" name="Title 1">
+            <a:extLst>
+              <a:ext uri="{FF2B5EF4-FFF2-40B4-BE49-F238E27FC236}">
+                <a16:creationId xmlns:a16="http://schemas.microsoft.com/office/drawing/2014/main" id="{0E014BC6-E8B9-4831-9870-0A8705DC795A}"/>
+              </a:ext>
+            </a:extLst>
+          </p:cNvPr>
+          <p:cNvSpPr>
+            <a:spLocks noGrp="1"/>
+          </p:cNvSpPr>
+          <p:nvPr>
+            <p:ph type="title"/>
+          </p:nvPr>
+        </p:nvSpPr>
+        <p:spPr>
+          <a:xfrm>
+            <a:off x="5116738" y="685798"/>
+            <a:ext cx="6159273" cy="4495801"/>
+          </a:xfrm>
+        </p:spPr>
+        <p:txBody>
+          <a:bodyPr vert="horz" lIns="91440" tIns="45720" rIns="91440" bIns="45720" rtlCol="0" anchor="ctr">
+            <a:normAutofit/>
+          </a:bodyPr>
+          <a:lstStyle/>
+          <a:p>
+            <a:r>
+              <a:rPr lang="en-US" sz="5400" dirty="0" err="1">
+                <a:solidFill>
+                  <a:srgbClr val="FFFFFF"/>
+                </a:solidFill>
+              </a:rPr>
+              <a:t>Vragen</a:t>
+            </a:r>
+            <a:r>
+              <a:rPr lang="en-US" sz="5400" dirty="0">
+                <a:solidFill>
+                  <a:srgbClr val="FFFFFF"/>
+                </a:solidFill>
+              </a:rPr>
+              <a:t>?</a:t>
+            </a:r>
+          </a:p>
+        </p:txBody>
+      </p:sp>
+    </p:spTree>
+    <p:extLst>
+      <p:ext uri="{BB962C8B-B14F-4D97-AF65-F5344CB8AC3E}">
+        <p14:creationId xmlns:p14="http://schemas.microsoft.com/office/powerpoint/2010/main" val="2841415295"/>
       </p:ext>
     </p:extLst>
   </p:cSld>

</xml_diff>

<commit_message>
Revert "added slide and slight text change pmp"
This reverts commit e76176167f3287816e4346212ee957663dae8ce5.
</commit_message>
<xml_diff>
--- a/2nd-Factor.pptx
+++ b/2nd-Factor.pptx
@@ -12,7 +12,6 @@
     <p:sldId id="260" r:id="rId6"/>
     <p:sldId id="261" r:id="rId7"/>
     <p:sldId id="262" r:id="rId8"/>
-    <p:sldId id="263" r:id="rId9"/>
   </p:sldIdLst>
   <p:sldSz cx="12192000" cy="6858000"/>
   <p:notesSz cx="6858000" cy="9144000"/>
@@ -933,7 +932,7 @@
           <a:p>
             <a:fld id="{00AA4164-34D5-4452-8196-C085709679C2}" type="datetimeFigureOut">
               <a:rPr lang="nl-NL" smtClean="0"/>
-              <a:t>20-1-2021</a:t>
+              <a:t>18-1-2021</a:t>
             </a:fld>
             <a:endParaRPr lang="nl-NL"/>
           </a:p>
@@ -975,7 +974,7 @@
           <a:p>
             <a:fld id="{ED99817C-485A-4F31-99A2-8B379398FC65}" type="slidenum">
               <a:rPr lang="nl-NL" smtClean="0"/>
-              <a:t>‹#›</a:t>
+              <a:t>‹nr.›</a:t>
             </a:fld>
             <a:endParaRPr lang="nl-NL"/>
           </a:p>
@@ -1369,7 +1368,7 @@
           <a:p>
             <a:fld id="{00AA4164-34D5-4452-8196-C085709679C2}" type="datetimeFigureOut">
               <a:rPr lang="nl-NL" smtClean="0"/>
-              <a:t>20-1-2021</a:t>
+              <a:t>18-1-2021</a:t>
             </a:fld>
             <a:endParaRPr lang="nl-NL"/>
           </a:p>
@@ -1411,7 +1410,7 @@
           <a:p>
             <a:fld id="{ED99817C-485A-4F31-99A2-8B379398FC65}" type="slidenum">
               <a:rPr lang="nl-NL" smtClean="0"/>
-              <a:t>‹#›</a:t>
+              <a:t>‹nr.›</a:t>
             </a:fld>
             <a:endParaRPr lang="nl-NL"/>
           </a:p>
@@ -1619,7 +1618,7 @@
           <a:p>
             <a:fld id="{00AA4164-34D5-4452-8196-C085709679C2}" type="datetimeFigureOut">
               <a:rPr lang="nl-NL" smtClean="0"/>
-              <a:t>20-1-2021</a:t>
+              <a:t>18-1-2021</a:t>
             </a:fld>
             <a:endParaRPr lang="nl-NL"/>
           </a:p>
@@ -1661,7 +1660,7 @@
           <a:p>
             <a:fld id="{ED99817C-485A-4F31-99A2-8B379398FC65}" type="slidenum">
               <a:rPr lang="nl-NL" smtClean="0"/>
-              <a:t>‹#›</a:t>
+              <a:t>‹nr.›</a:t>
             </a:fld>
             <a:endParaRPr lang="nl-NL"/>
           </a:p>
@@ -1927,7 +1926,7 @@
           <a:p>
             <a:fld id="{00AA4164-34D5-4452-8196-C085709679C2}" type="datetimeFigureOut">
               <a:rPr lang="nl-NL" smtClean="0"/>
-              <a:t>20-1-2021</a:t>
+              <a:t>18-1-2021</a:t>
             </a:fld>
             <a:endParaRPr lang="nl-NL"/>
           </a:p>
@@ -1969,7 +1968,7 @@
           <a:p>
             <a:fld id="{ED99817C-485A-4F31-99A2-8B379398FC65}" type="slidenum">
               <a:rPr lang="nl-NL" smtClean="0"/>
-              <a:t>‹#›</a:t>
+              <a:t>‹nr.›</a:t>
             </a:fld>
             <a:endParaRPr lang="nl-NL"/>
           </a:p>
@@ -2245,7 +2244,7 @@
           <a:p>
             <a:fld id="{00AA4164-34D5-4452-8196-C085709679C2}" type="datetimeFigureOut">
               <a:rPr lang="nl-NL" smtClean="0"/>
-              <a:t>20-1-2021</a:t>
+              <a:t>18-1-2021</a:t>
             </a:fld>
             <a:endParaRPr lang="nl-NL"/>
           </a:p>
@@ -2287,7 +2286,7 @@
           <a:p>
             <a:fld id="{ED99817C-485A-4F31-99A2-8B379398FC65}" type="slidenum">
               <a:rPr lang="nl-NL" smtClean="0"/>
-              <a:t>‹#›</a:t>
+              <a:t>‹nr.›</a:t>
             </a:fld>
             <a:endParaRPr lang="nl-NL"/>
           </a:p>
@@ -2547,7 +2546,7 @@
           <a:p>
             <a:fld id="{00AA4164-34D5-4452-8196-C085709679C2}" type="datetimeFigureOut">
               <a:rPr lang="nl-NL" smtClean="0"/>
-              <a:t>20-1-2021</a:t>
+              <a:t>18-1-2021</a:t>
             </a:fld>
             <a:endParaRPr lang="nl-NL"/>
           </a:p>
@@ -2589,7 +2588,7 @@
           <a:p>
             <a:fld id="{ED99817C-485A-4F31-99A2-8B379398FC65}" type="slidenum">
               <a:rPr lang="nl-NL" smtClean="0"/>
-              <a:t>‹#›</a:t>
+              <a:t>‹nr.›</a:t>
             </a:fld>
             <a:endParaRPr lang="nl-NL"/>
           </a:p>
@@ -2914,7 +2913,7 @@
           <a:p>
             <a:fld id="{00AA4164-34D5-4452-8196-C085709679C2}" type="datetimeFigureOut">
               <a:rPr lang="nl-NL" smtClean="0"/>
-              <a:t>20-1-2021</a:t>
+              <a:t>18-1-2021</a:t>
             </a:fld>
             <a:endParaRPr lang="nl-NL"/>
           </a:p>
@@ -2956,7 +2955,7 @@
           <a:p>
             <a:fld id="{ED99817C-485A-4F31-99A2-8B379398FC65}" type="slidenum">
               <a:rPr lang="nl-NL" smtClean="0"/>
-              <a:t>‹#›</a:t>
+              <a:t>‹nr.›</a:t>
             </a:fld>
             <a:endParaRPr lang="nl-NL"/>
           </a:p>
@@ -3088,7 +3087,7 @@
           <a:p>
             <a:fld id="{00AA4164-34D5-4452-8196-C085709679C2}" type="datetimeFigureOut">
               <a:rPr lang="nl-NL" smtClean="0"/>
-              <a:t>20-1-2021</a:t>
+              <a:t>18-1-2021</a:t>
             </a:fld>
             <a:endParaRPr lang="nl-NL"/>
           </a:p>
@@ -3130,7 +3129,7 @@
           <a:p>
             <a:fld id="{ED99817C-485A-4F31-99A2-8B379398FC65}" type="slidenum">
               <a:rPr lang="nl-NL" smtClean="0"/>
-              <a:t>‹#›</a:t>
+              <a:t>‹nr.›</a:t>
             </a:fld>
             <a:endParaRPr lang="nl-NL"/>
           </a:p>
@@ -3268,7 +3267,7 @@
           <a:p>
             <a:fld id="{00AA4164-34D5-4452-8196-C085709679C2}" type="datetimeFigureOut">
               <a:rPr lang="nl-NL" smtClean="0"/>
-              <a:t>20-1-2021</a:t>
+              <a:t>18-1-2021</a:t>
             </a:fld>
             <a:endParaRPr lang="nl-NL"/>
           </a:p>
@@ -3310,7 +3309,7 @@
           <a:p>
             <a:fld id="{ED99817C-485A-4F31-99A2-8B379398FC65}" type="slidenum">
               <a:rPr lang="nl-NL" smtClean="0"/>
-              <a:t>‹#›</a:t>
+              <a:t>‹nr.›</a:t>
             </a:fld>
             <a:endParaRPr lang="nl-NL"/>
           </a:p>
@@ -3438,7 +3437,7 @@
           <a:p>
             <a:fld id="{00AA4164-34D5-4452-8196-C085709679C2}" type="datetimeFigureOut">
               <a:rPr lang="nl-NL" smtClean="0"/>
-              <a:t>20-1-2021</a:t>
+              <a:t>18-1-2021</a:t>
             </a:fld>
             <a:endParaRPr lang="nl-NL"/>
           </a:p>
@@ -3480,7 +3479,7 @@
           <a:p>
             <a:fld id="{ED99817C-485A-4F31-99A2-8B379398FC65}" type="slidenum">
               <a:rPr lang="nl-NL" smtClean="0"/>
-              <a:t>‹#›</a:t>
+              <a:t>‹nr.›</a:t>
             </a:fld>
             <a:endParaRPr lang="nl-NL"/>
           </a:p>
@@ -3688,7 +3687,7 @@
           <a:p>
             <a:fld id="{00AA4164-34D5-4452-8196-C085709679C2}" type="datetimeFigureOut">
               <a:rPr lang="nl-NL" smtClean="0"/>
-              <a:t>20-1-2021</a:t>
+              <a:t>18-1-2021</a:t>
             </a:fld>
             <a:endParaRPr lang="nl-NL"/>
           </a:p>
@@ -3730,7 +3729,7 @@
           <a:p>
             <a:fld id="{ED99817C-485A-4F31-99A2-8B379398FC65}" type="slidenum">
               <a:rPr lang="nl-NL" smtClean="0"/>
-              <a:t>‹#›</a:t>
+              <a:t>‹nr.›</a:t>
             </a:fld>
             <a:endParaRPr lang="nl-NL"/>
           </a:p>
@@ -3924,7 +3923,7 @@
           <a:p>
             <a:fld id="{00AA4164-34D5-4452-8196-C085709679C2}" type="datetimeFigureOut">
               <a:rPr lang="nl-NL" smtClean="0"/>
-              <a:t>20-1-2021</a:t>
+              <a:t>18-1-2021</a:t>
             </a:fld>
             <a:endParaRPr lang="nl-NL"/>
           </a:p>
@@ -3966,7 +3965,7 @@
           <a:p>
             <a:fld id="{ED99817C-485A-4F31-99A2-8B379398FC65}" type="slidenum">
               <a:rPr lang="nl-NL" smtClean="0"/>
-              <a:t>‹#›</a:t>
+              <a:t>‹nr.›</a:t>
             </a:fld>
             <a:endParaRPr lang="nl-NL"/>
           </a:p>
@@ -4306,7 +4305,7 @@
           <a:p>
             <a:fld id="{00AA4164-34D5-4452-8196-C085709679C2}" type="datetimeFigureOut">
               <a:rPr lang="nl-NL" smtClean="0"/>
-              <a:t>20-1-2021</a:t>
+              <a:t>18-1-2021</a:t>
             </a:fld>
             <a:endParaRPr lang="nl-NL"/>
           </a:p>
@@ -4348,7 +4347,7 @@
           <a:p>
             <a:fld id="{ED99817C-485A-4F31-99A2-8B379398FC65}" type="slidenum">
               <a:rPr lang="nl-NL" smtClean="0"/>
-              <a:t>‹#›</a:t>
+              <a:t>‹nr.›</a:t>
             </a:fld>
             <a:endParaRPr lang="nl-NL"/>
           </a:p>
@@ -4424,7 +4423,7 @@
           <a:p>
             <a:fld id="{00AA4164-34D5-4452-8196-C085709679C2}" type="datetimeFigureOut">
               <a:rPr lang="nl-NL" smtClean="0"/>
-              <a:t>20-1-2021</a:t>
+              <a:t>18-1-2021</a:t>
             </a:fld>
             <a:endParaRPr lang="nl-NL"/>
           </a:p>
@@ -4466,7 +4465,7 @@
           <a:p>
             <a:fld id="{ED99817C-485A-4F31-99A2-8B379398FC65}" type="slidenum">
               <a:rPr lang="nl-NL" smtClean="0"/>
-              <a:t>‹#›</a:t>
+              <a:t>‹nr.›</a:t>
             </a:fld>
             <a:endParaRPr lang="nl-NL"/>
           </a:p>
@@ -4519,7 +4518,7 @@
           <a:p>
             <a:fld id="{00AA4164-34D5-4452-8196-C085709679C2}" type="datetimeFigureOut">
               <a:rPr lang="nl-NL" smtClean="0"/>
-              <a:t>20-1-2021</a:t>
+              <a:t>18-1-2021</a:t>
             </a:fld>
             <a:endParaRPr lang="nl-NL"/>
           </a:p>
@@ -4561,7 +4560,7 @@
           <a:p>
             <a:fld id="{ED99817C-485A-4F31-99A2-8B379398FC65}" type="slidenum">
               <a:rPr lang="nl-NL" smtClean="0"/>
-              <a:t>‹#›</a:t>
+              <a:t>‹nr.›</a:t>
             </a:fld>
             <a:endParaRPr lang="nl-NL"/>
           </a:p>
@@ -4774,7 +4773,7 @@
           <a:p>
             <a:fld id="{00AA4164-34D5-4452-8196-C085709679C2}" type="datetimeFigureOut">
               <a:rPr lang="nl-NL" smtClean="0"/>
-              <a:t>20-1-2021</a:t>
+              <a:t>18-1-2021</a:t>
             </a:fld>
             <a:endParaRPr lang="nl-NL"/>
           </a:p>
@@ -4816,7 +4815,7 @@
           <a:p>
             <a:fld id="{ED99817C-485A-4F31-99A2-8B379398FC65}" type="slidenum">
               <a:rPr lang="nl-NL" smtClean="0"/>
-              <a:t>‹#›</a:t>
+              <a:t>‹nr.›</a:t>
             </a:fld>
             <a:endParaRPr lang="nl-NL"/>
           </a:p>
@@ -5057,7 +5056,7 @@
           <a:p>
             <a:fld id="{00AA4164-34D5-4452-8196-C085709679C2}" type="datetimeFigureOut">
               <a:rPr lang="nl-NL" smtClean="0"/>
-              <a:t>20-1-2021</a:t>
+              <a:t>18-1-2021</a:t>
             </a:fld>
             <a:endParaRPr lang="nl-NL"/>
           </a:p>
@@ -5099,7 +5098,7 @@
           <a:p>
             <a:fld id="{ED99817C-485A-4F31-99A2-8B379398FC65}" type="slidenum">
               <a:rPr lang="nl-NL" smtClean="0"/>
-              <a:t>‹#›</a:t>
+              <a:t>‹nr.›</a:t>
             </a:fld>
             <a:endParaRPr lang="nl-NL"/>
           </a:p>
@@ -5463,7 +5462,7 @@
           <a:p>
             <a:fld id="{00AA4164-34D5-4452-8196-C085709679C2}" type="datetimeFigureOut">
               <a:rPr lang="nl-NL" smtClean="0"/>
-              <a:t>20-1-2021</a:t>
+              <a:t>18-1-2021</a:t>
             </a:fld>
             <a:endParaRPr lang="nl-NL"/>
           </a:p>
@@ -5545,7 +5544,7 @@
           <a:p>
             <a:fld id="{ED99817C-485A-4F31-99A2-8B379398FC65}" type="slidenum">
               <a:rPr lang="nl-NL" smtClean="0"/>
-              <a:t>‹#›</a:t>
+              <a:t>‹nr.›</a:t>
             </a:fld>
             <a:endParaRPr lang="nl-NL"/>
           </a:p>
@@ -6215,7 +6214,7 @@
           </a:bodyPr>
           <a:lstStyle/>
           <a:p>
-            <a:endParaRPr lang="nl-NL" dirty="0">
+            <a:endParaRPr lang="nl-NL">
               <a:solidFill>
                 <a:schemeClr val="tx1">
                   <a:alpha val="80000"/>
@@ -9596,831 +9595,6 @@
     <p:extLst>
       <p:ext uri="{BB962C8B-B14F-4D97-AF65-F5344CB8AC3E}">
         <p14:creationId xmlns:p14="http://schemas.microsoft.com/office/powerpoint/2010/main" val="1249222413"/>
-      </p:ext>
-    </p:extLst>
-  </p:cSld>
-  <p:clrMapOvr>
-    <a:masterClrMapping/>
-  </p:clrMapOvr>
-</p:sld>
-</file>
-
-<file path=ppt/slides/slide8.xml><?xml version="1.0" encoding="utf-8"?>
-<p:sld xmlns:a="http://schemas.openxmlformats.org/drawingml/2006/main" xmlns:r="http://schemas.openxmlformats.org/officeDocument/2006/relationships" xmlns:p="http://schemas.openxmlformats.org/presentationml/2006/main">
-  <p:cSld>
-    <p:bg>
-      <p:bgPr>
-        <a:solidFill>
-          <a:schemeClr val="bg2"/>
-        </a:solidFill>
-        <a:effectLst/>
-      </p:bgPr>
-    </p:bg>
-    <p:spTree>
-      <p:nvGrpSpPr>
-        <p:cNvPr id="1" name=""/>
-        <p:cNvGrpSpPr/>
-        <p:nvPr/>
-      </p:nvGrpSpPr>
-      <p:grpSpPr>
-        <a:xfrm>
-          <a:off x="0" y="0"/>
-          <a:ext cx="0" cy="0"/>
-          <a:chOff x="0" y="0"/>
-          <a:chExt cx="0" cy="0"/>
-        </a:xfrm>
-      </p:grpSpPr>
-      <p:cxnSp>
-        <p:nvCxnSpPr>
-          <p:cNvPr id="8" name="Straight Connector 7">
-            <a:extLst>
-              <a:ext uri="{FF2B5EF4-FFF2-40B4-BE49-F238E27FC236}">
-                <a16:creationId xmlns:a16="http://schemas.microsoft.com/office/drawing/2014/main" id="{FEB90296-CFE0-401D-9CA3-32966EC4F01D}"/>
-              </a:ext>
-              <a:ext uri="{C183D7F6-B498-43B3-948B-1728B52AA6E4}">
-                <adec:decorative xmlns:adec="http://schemas.microsoft.com/office/drawing/2017/decorative" val="1"/>
-              </a:ext>
-            </a:extLst>
-          </p:cNvPr>
-          <p:cNvCxnSpPr>
-            <a:cxnSpLocks noGrp="1" noRot="1" noChangeAspect="1" noMove="1" noResize="1" noEditPoints="1" noAdjustHandles="1" noChangeArrowheads="1" noChangeShapeType="1"/>
-          </p:cNvCxnSpPr>
-          <p:nvPr>
-            <p:extLst>
-              <p:ext uri="{386F3935-93C4-4BCD-93E2-E3B085C9AB24}">
-                <p16:designElem xmlns:p16="http://schemas.microsoft.com/office/powerpoint/2015/main" val="1"/>
-              </p:ext>
-            </p:extLst>
-          </p:nvPr>
-        </p:nvCxnSpPr>
-        <p:spPr>
-          <a:xfrm flipH="1">
-            <a:off x="8228012" y="8467"/>
-            <a:ext cx="3810000" cy="3810000"/>
-          </a:xfrm>
-          <a:prstGeom prst="line">
-            <a:avLst/>
-          </a:prstGeom>
-          <a:ln w="12700">
-            <a:solidFill>
-              <a:schemeClr val="tx1"/>
-            </a:solidFill>
-          </a:ln>
-        </p:spPr>
-        <p:style>
-          <a:lnRef idx="2">
-            <a:schemeClr val="accent1"/>
-          </a:lnRef>
-          <a:fillRef idx="0">
-            <a:schemeClr val="accent1"/>
-          </a:fillRef>
-          <a:effectRef idx="1">
-            <a:schemeClr val="accent1"/>
-          </a:effectRef>
-          <a:fontRef idx="minor">
-            <a:schemeClr val="tx1"/>
-          </a:fontRef>
-        </p:style>
-      </p:cxnSp>
-      <p:cxnSp>
-        <p:nvCxnSpPr>
-          <p:cNvPr id="10" name="Straight Connector 9">
-            <a:extLst>
-              <a:ext uri="{FF2B5EF4-FFF2-40B4-BE49-F238E27FC236}">
-                <a16:creationId xmlns:a16="http://schemas.microsoft.com/office/drawing/2014/main" id="{08C9B4EE-7611-4ED9-B356-7BDD377C39B0}"/>
-              </a:ext>
-              <a:ext uri="{C183D7F6-B498-43B3-948B-1728B52AA6E4}">
-                <adec:decorative xmlns:adec="http://schemas.microsoft.com/office/drawing/2017/decorative" val="1"/>
-              </a:ext>
-            </a:extLst>
-          </p:cNvPr>
-          <p:cNvCxnSpPr>
-            <a:cxnSpLocks noGrp="1" noRot="1" noChangeAspect="1" noMove="1" noResize="1" noEditPoints="1" noAdjustHandles="1" noChangeArrowheads="1" noChangeShapeType="1"/>
-          </p:cNvCxnSpPr>
-          <p:nvPr>
-            <p:extLst>
-              <p:ext uri="{386F3935-93C4-4BCD-93E2-E3B085C9AB24}">
-                <p16:designElem xmlns:p16="http://schemas.microsoft.com/office/powerpoint/2015/main" val="1"/>
-              </p:ext>
-            </p:extLst>
-          </p:nvPr>
-        </p:nvCxnSpPr>
-        <p:spPr>
-          <a:xfrm flipH="1">
-            <a:off x="6108170" y="91545"/>
-            <a:ext cx="6080655" cy="6080655"/>
-          </a:xfrm>
-          <a:prstGeom prst="line">
-            <a:avLst/>
-          </a:prstGeom>
-          <a:ln w="12700">
-            <a:solidFill>
-              <a:schemeClr val="tx1"/>
-            </a:solidFill>
-          </a:ln>
-        </p:spPr>
-        <p:style>
-          <a:lnRef idx="2">
-            <a:schemeClr val="accent1"/>
-          </a:lnRef>
-          <a:fillRef idx="0">
-            <a:schemeClr val="accent1"/>
-          </a:fillRef>
-          <a:effectRef idx="1">
-            <a:schemeClr val="accent1"/>
-          </a:effectRef>
-          <a:fontRef idx="minor">
-            <a:schemeClr val="tx1"/>
-          </a:fontRef>
-        </p:style>
-      </p:cxnSp>
-      <p:cxnSp>
-        <p:nvCxnSpPr>
-          <p:cNvPr id="12" name="Straight Connector 11">
-            <a:extLst>
-              <a:ext uri="{FF2B5EF4-FFF2-40B4-BE49-F238E27FC236}">
-                <a16:creationId xmlns:a16="http://schemas.microsoft.com/office/drawing/2014/main" id="{4A4F266A-F2F7-47CD-8BBC-E3777E982FD2}"/>
-              </a:ext>
-              <a:ext uri="{C183D7F6-B498-43B3-948B-1728B52AA6E4}">
-                <adec:decorative xmlns:adec="http://schemas.microsoft.com/office/drawing/2017/decorative" val="1"/>
-              </a:ext>
-            </a:extLst>
-          </p:cNvPr>
-          <p:cNvCxnSpPr>
-            <a:cxnSpLocks noGrp="1" noRot="1" noChangeAspect="1" noMove="1" noResize="1" noEditPoints="1" noAdjustHandles="1" noChangeArrowheads="1" noChangeShapeType="1"/>
-          </p:cNvCxnSpPr>
-          <p:nvPr>
-            <p:extLst>
-              <p:ext uri="{386F3935-93C4-4BCD-93E2-E3B085C9AB24}">
-                <p16:designElem xmlns:p16="http://schemas.microsoft.com/office/powerpoint/2015/main" val="1"/>
-              </p:ext>
-            </p:extLst>
-          </p:nvPr>
-        </p:nvCxnSpPr>
-        <p:spPr>
-          <a:xfrm flipH="1">
-            <a:off x="7235825" y="228600"/>
-            <a:ext cx="4953000" cy="4953000"/>
-          </a:xfrm>
-          <a:prstGeom prst="line">
-            <a:avLst/>
-          </a:prstGeom>
-          <a:ln w="12700">
-            <a:solidFill>
-              <a:schemeClr val="tx1"/>
-            </a:solidFill>
-          </a:ln>
-        </p:spPr>
-        <p:style>
-          <a:lnRef idx="2">
-            <a:schemeClr val="accent1"/>
-          </a:lnRef>
-          <a:fillRef idx="0">
-            <a:schemeClr val="accent1"/>
-          </a:fillRef>
-          <a:effectRef idx="1">
-            <a:schemeClr val="accent1"/>
-          </a:effectRef>
-          <a:fontRef idx="minor">
-            <a:schemeClr val="tx1"/>
-          </a:fontRef>
-        </p:style>
-      </p:cxnSp>
-      <p:cxnSp>
-        <p:nvCxnSpPr>
-          <p:cNvPr id="14" name="Straight Connector 13">
-            <a:extLst>
-              <a:ext uri="{FF2B5EF4-FFF2-40B4-BE49-F238E27FC236}">
-                <a16:creationId xmlns:a16="http://schemas.microsoft.com/office/drawing/2014/main" id="{20D69C80-8919-4A32-B897-F2A21F940574}"/>
-              </a:ext>
-              <a:ext uri="{C183D7F6-B498-43B3-948B-1728B52AA6E4}">
-                <adec:decorative xmlns:adec="http://schemas.microsoft.com/office/drawing/2017/decorative" val="1"/>
-              </a:ext>
-            </a:extLst>
-          </p:cNvPr>
-          <p:cNvCxnSpPr>
-            <a:cxnSpLocks noGrp="1" noRot="1" noChangeAspect="1" noMove="1" noResize="1" noEditPoints="1" noAdjustHandles="1" noChangeArrowheads="1" noChangeShapeType="1"/>
-          </p:cNvCxnSpPr>
-          <p:nvPr>
-            <p:extLst>
-              <p:ext uri="{386F3935-93C4-4BCD-93E2-E3B085C9AB24}">
-                <p16:designElem xmlns:p16="http://schemas.microsoft.com/office/powerpoint/2015/main" val="1"/>
-              </p:ext>
-            </p:extLst>
-          </p:nvPr>
-        </p:nvCxnSpPr>
-        <p:spPr>
-          <a:xfrm flipH="1">
-            <a:off x="7335837" y="32278"/>
-            <a:ext cx="4852989" cy="4852989"/>
-          </a:xfrm>
-          <a:prstGeom prst="line">
-            <a:avLst/>
-          </a:prstGeom>
-          <a:ln w="31750">
-            <a:solidFill>
-              <a:schemeClr val="tx1"/>
-            </a:solidFill>
-          </a:ln>
-        </p:spPr>
-        <p:style>
-          <a:lnRef idx="2">
-            <a:schemeClr val="accent1"/>
-          </a:lnRef>
-          <a:fillRef idx="0">
-            <a:schemeClr val="accent1"/>
-          </a:fillRef>
-          <a:effectRef idx="1">
-            <a:schemeClr val="accent1"/>
-          </a:effectRef>
-          <a:fontRef idx="minor">
-            <a:schemeClr val="tx1"/>
-          </a:fontRef>
-        </p:style>
-      </p:cxnSp>
-      <p:cxnSp>
-        <p:nvCxnSpPr>
-          <p:cNvPr id="16" name="Straight Connector 15">
-            <a:extLst>
-              <a:ext uri="{FF2B5EF4-FFF2-40B4-BE49-F238E27FC236}">
-                <a16:creationId xmlns:a16="http://schemas.microsoft.com/office/drawing/2014/main" id="{F427B072-CC5B-481B-9719-8CD4C54444BE}"/>
-              </a:ext>
-              <a:ext uri="{C183D7F6-B498-43B3-948B-1728B52AA6E4}">
-                <adec:decorative xmlns:adec="http://schemas.microsoft.com/office/drawing/2017/decorative" val="1"/>
-              </a:ext>
-            </a:extLst>
-          </p:cNvPr>
-          <p:cNvCxnSpPr>
-            <a:cxnSpLocks noGrp="1" noRot="1" noChangeAspect="1" noMove="1" noResize="1" noEditPoints="1" noAdjustHandles="1" noChangeArrowheads="1" noChangeShapeType="1"/>
-          </p:cNvCxnSpPr>
-          <p:nvPr>
-            <p:extLst>
-              <p:ext uri="{386F3935-93C4-4BCD-93E2-E3B085C9AB24}">
-                <p16:designElem xmlns:p16="http://schemas.microsoft.com/office/powerpoint/2015/main" val="1"/>
-              </p:ext>
-            </p:extLst>
-          </p:nvPr>
-        </p:nvCxnSpPr>
-        <p:spPr>
-          <a:xfrm flipH="1">
-            <a:off x="7845426" y="609601"/>
-            <a:ext cx="4343399" cy="4343399"/>
-          </a:xfrm>
-          <a:prstGeom prst="line">
-            <a:avLst/>
-          </a:prstGeom>
-          <a:ln w="31750">
-            <a:solidFill>
-              <a:schemeClr val="tx1"/>
-            </a:solidFill>
-          </a:ln>
-        </p:spPr>
-        <p:style>
-          <a:lnRef idx="2">
-            <a:schemeClr val="accent1"/>
-          </a:lnRef>
-          <a:fillRef idx="0">
-            <a:schemeClr val="accent1"/>
-          </a:fillRef>
-          <a:effectRef idx="1">
-            <a:schemeClr val="accent1"/>
-          </a:effectRef>
-          <a:fontRef idx="minor">
-            <a:schemeClr val="tx1"/>
-          </a:fontRef>
-        </p:style>
-      </p:cxnSp>
-      <p:sp useBgFill="1">
-        <p:nvSpPr>
-          <p:cNvPr id="18" name="Rectangle 17">
-            <a:extLst>
-              <a:ext uri="{FF2B5EF4-FFF2-40B4-BE49-F238E27FC236}">
-                <a16:creationId xmlns:a16="http://schemas.microsoft.com/office/drawing/2014/main" id="{313BE87B-D7FD-4BF3-A7BC-511F522528C2}"/>
-              </a:ext>
-              <a:ext uri="{C183D7F6-B498-43B3-948B-1728B52AA6E4}">
-                <adec:decorative xmlns:adec="http://schemas.microsoft.com/office/drawing/2017/decorative" val="1"/>
-              </a:ext>
-            </a:extLst>
-          </p:cNvPr>
-          <p:cNvSpPr>
-            <a:spLocks noGrp="1" noRot="1" noChangeAspect="1" noMove="1" noResize="1" noEditPoints="1" noAdjustHandles="1" noChangeArrowheads="1" noChangeShapeType="1" noTextEdit="1"/>
-          </p:cNvSpPr>
-          <p:nvPr>
-            <p:extLst>
-              <p:ext uri="{386F3935-93C4-4BCD-93E2-E3B085C9AB24}">
-                <p16:designElem xmlns:p16="http://schemas.microsoft.com/office/powerpoint/2015/main" val="1"/>
-              </p:ext>
-            </p:extLst>
-          </p:nvPr>
-        </p:nvSpPr>
-        <p:spPr>
-          <a:xfrm>
-            <a:off x="0" y="0"/>
-            <a:ext cx="12192000" cy="6858000"/>
-          </a:xfrm>
-          <a:prstGeom prst="rect">
-            <a:avLst/>
-          </a:prstGeom>
-          <a:solidFill>
-            <a:schemeClr val="accent1"/>
-          </a:solidFill>
-          <a:ln>
-            <a:noFill/>
-          </a:ln>
-        </p:spPr>
-        <p:style>
-          <a:lnRef idx="2">
-            <a:schemeClr val="accent1">
-              <a:shade val="50000"/>
-            </a:schemeClr>
-          </a:lnRef>
-          <a:fillRef idx="1">
-            <a:schemeClr val="accent1"/>
-          </a:fillRef>
-          <a:effectRef idx="0">
-            <a:schemeClr val="accent1"/>
-          </a:effectRef>
-          <a:fontRef idx="minor">
-            <a:schemeClr val="lt1"/>
-          </a:fontRef>
-        </p:style>
-        <p:txBody>
-          <a:bodyPr rtlCol="0" anchor="ctr"/>
-          <a:lstStyle/>
-          <a:p>
-            <a:pPr algn="ctr"/>
-            <a:endParaRPr lang="en-US"/>
-          </a:p>
-        </p:txBody>
-      </p:sp>
-      <p:sp>
-        <p:nvSpPr>
-          <p:cNvPr id="20" name="Rectangle 19">
-            <a:extLst>
-              <a:ext uri="{FF2B5EF4-FFF2-40B4-BE49-F238E27FC236}">
-                <a16:creationId xmlns:a16="http://schemas.microsoft.com/office/drawing/2014/main" id="{035A481B-C639-4892-B0EF-4D8373A9B06A}"/>
-              </a:ext>
-              <a:ext uri="{C183D7F6-B498-43B3-948B-1728B52AA6E4}">
-                <adec:decorative xmlns:adec="http://schemas.microsoft.com/office/drawing/2017/decorative" val="1"/>
-              </a:ext>
-            </a:extLst>
-          </p:cNvPr>
-          <p:cNvSpPr>
-            <a:spLocks noGrp="1" noRot="1" noChangeAspect="1" noMove="1" noResize="1" noEditPoints="1" noAdjustHandles="1" noChangeArrowheads="1" noChangeShapeType="1" noTextEdit="1"/>
-          </p:cNvSpPr>
-          <p:nvPr>
-            <p:extLst>
-              <p:ext uri="{386F3935-93C4-4BCD-93E2-E3B085C9AB24}">
-                <p16:designElem xmlns:p16="http://schemas.microsoft.com/office/powerpoint/2015/main" val="1"/>
-              </p:ext>
-            </p:extLst>
-          </p:nvPr>
-        </p:nvSpPr>
-        <p:spPr>
-          <a:xfrm>
-            <a:off x="0" y="-1"/>
-            <a:ext cx="4639734" cy="6858000"/>
-          </a:xfrm>
-          <a:prstGeom prst="rect">
-            <a:avLst/>
-          </a:prstGeom>
-          <a:solidFill>
-            <a:schemeClr val="accent1">
-              <a:lumMod val="75000"/>
-            </a:schemeClr>
-          </a:solidFill>
-          <a:ln>
-            <a:noFill/>
-          </a:ln>
-          <a:effectLst/>
-        </p:spPr>
-        <p:style>
-          <a:lnRef idx="2">
-            <a:schemeClr val="accent1">
-              <a:shade val="50000"/>
-            </a:schemeClr>
-          </a:lnRef>
-          <a:fillRef idx="1001">
-            <a:schemeClr val="dk2"/>
-          </a:fillRef>
-          <a:effectRef idx="0">
-            <a:schemeClr val="accent1"/>
-          </a:effectRef>
-          <a:fontRef idx="minor">
-            <a:schemeClr val="lt1"/>
-          </a:fontRef>
-        </p:style>
-        <p:txBody>
-          <a:bodyPr rtlCol="0" anchor="ctr"/>
-          <a:lstStyle/>
-          <a:p>
-            <a:pPr algn="ctr"/>
-            <a:endParaRPr lang="en-US"/>
-          </a:p>
-        </p:txBody>
-      </p:sp>
-      <p:sp>
-        <p:nvSpPr>
-          <p:cNvPr id="22" name="Rectangle 21">
-            <a:extLst>
-              <a:ext uri="{FF2B5EF4-FFF2-40B4-BE49-F238E27FC236}">
-                <a16:creationId xmlns:a16="http://schemas.microsoft.com/office/drawing/2014/main" id="{052BD58B-6284-459E-9FF4-A97F3A569074}"/>
-              </a:ext>
-              <a:ext uri="{C183D7F6-B498-43B3-948B-1728B52AA6E4}">
-                <adec:decorative xmlns:adec="http://schemas.microsoft.com/office/drawing/2017/decorative" val="1"/>
-              </a:ext>
-            </a:extLst>
-          </p:cNvPr>
-          <p:cNvSpPr>
-            <a:spLocks noGrp="1" noRot="1" noChangeAspect="1" noMove="1" noResize="1" noEditPoints="1" noAdjustHandles="1" noChangeArrowheads="1" noChangeShapeType="1" noTextEdit="1"/>
-          </p:cNvSpPr>
-          <p:nvPr>
-            <p:extLst>
-              <p:ext uri="{386F3935-93C4-4BCD-93E2-E3B085C9AB24}">
-                <p16:designElem xmlns:p16="http://schemas.microsoft.com/office/powerpoint/2015/main" val="1"/>
-              </p:ext>
-            </p:extLst>
-          </p:nvPr>
-        </p:nvSpPr>
-        <p:spPr>
-          <a:xfrm>
-            <a:off x="0" y="-2"/>
-            <a:ext cx="1438656" cy="6858000"/>
-          </a:xfrm>
-          <a:prstGeom prst="rect">
-            <a:avLst/>
-          </a:prstGeom>
-          <a:solidFill>
-            <a:schemeClr val="accent1">
-              <a:lumMod val="50000"/>
-            </a:schemeClr>
-          </a:solidFill>
-          <a:ln>
-            <a:noFill/>
-          </a:ln>
-        </p:spPr>
-        <p:style>
-          <a:lnRef idx="2">
-            <a:schemeClr val="accent1">
-              <a:shade val="50000"/>
-            </a:schemeClr>
-          </a:lnRef>
-          <a:fillRef idx="1003">
-            <a:schemeClr val="lt1"/>
-          </a:fillRef>
-          <a:effectRef idx="0">
-            <a:schemeClr val="accent1"/>
-          </a:effectRef>
-          <a:fontRef idx="minor">
-            <a:schemeClr val="lt1"/>
-          </a:fontRef>
-        </p:style>
-        <p:txBody>
-          <a:bodyPr rtlCol="0" anchor="ctr"/>
-          <a:lstStyle/>
-          <a:p>
-            <a:pPr algn="ctr"/>
-            <a:endParaRPr lang="en-US">
-              <a:solidFill>
-                <a:schemeClr val="accent2"/>
-              </a:solidFill>
-            </a:endParaRPr>
-          </a:p>
-        </p:txBody>
-      </p:sp>
-      <p:grpSp>
-        <p:nvGrpSpPr>
-          <p:cNvPr id="24" name="Group 23">
-            <a:extLst>
-              <a:ext uri="{FF2B5EF4-FFF2-40B4-BE49-F238E27FC236}">
-                <a16:creationId xmlns:a16="http://schemas.microsoft.com/office/drawing/2014/main" id="{AE589C21-CEDE-4D90-AC85-6E43B68D1316}"/>
-              </a:ext>
-              <a:ext uri="{C183D7F6-B498-43B3-948B-1728B52AA6E4}">
-                <adec:decorative xmlns:adec="http://schemas.microsoft.com/office/drawing/2017/decorative" val="1"/>
-              </a:ext>
-            </a:extLst>
-          </p:cNvPr>
-          <p:cNvGrpSpPr>
-            <a:grpSpLocks noGrp="1" noUngrp="1" noRot="1" noChangeAspect="1" noMove="1" noResize="1"/>
-          </p:cNvGrpSpPr>
-          <p:nvPr>
-            <p:extLst>
-              <p:ext uri="{386F3935-93C4-4BCD-93E2-E3B085C9AB24}">
-                <p16:designElem xmlns:p16="http://schemas.microsoft.com/office/powerpoint/2015/main" val="1"/>
-              </p:ext>
-            </p:extLst>
-          </p:nvPr>
-        </p:nvGrpSpPr>
-        <p:grpSpPr>
-          <a:xfrm>
-            <a:off x="9206969" y="3449715"/>
-            <a:ext cx="2981858" cy="3208867"/>
-            <a:chOff x="9206969" y="2963333"/>
-            <a:chExt cx="2981858" cy="3208867"/>
-          </a:xfrm>
-        </p:grpSpPr>
-        <p:cxnSp>
-          <p:nvCxnSpPr>
-            <p:cNvPr id="25" name="Straight Connector 24">
-              <a:extLst>
-                <a:ext uri="{FF2B5EF4-FFF2-40B4-BE49-F238E27FC236}">
-                  <a16:creationId xmlns:a16="http://schemas.microsoft.com/office/drawing/2014/main" id="{1F4121EC-0ADD-45C0-85F0-D49F67A3ED8B}"/>
-                </a:ext>
-                <a:ext uri="{C183D7F6-B498-43B3-948B-1728B52AA6E4}">
-                  <adec:decorative xmlns:adec="http://schemas.microsoft.com/office/drawing/2017/decorative" val="1"/>
-                </a:ext>
-              </a:extLst>
-            </p:cNvPr>
-            <p:cNvCxnSpPr/>
-            <p:nvPr>
-              <p:extLst>
-                <p:ext uri="{386F3935-93C4-4BCD-93E2-E3B085C9AB24}">
-                  <p16:designElem xmlns:p16="http://schemas.microsoft.com/office/powerpoint/2015/main" val="1"/>
-                </p:ext>
-              </p:extLst>
-            </p:nvPr>
-          </p:nvCxnSpPr>
-          <p:spPr>
-            <a:xfrm flipH="1">
-              <a:off x="11276012" y="2963333"/>
-              <a:ext cx="912814" cy="912812"/>
-            </a:xfrm>
-            <a:prstGeom prst="line">
-              <a:avLst/>
-            </a:prstGeom>
-            <a:ln w="9525">
-              <a:solidFill>
-                <a:srgbClr val="FFFFFF"/>
-              </a:solidFill>
-            </a:ln>
-          </p:spPr>
-          <p:style>
-            <a:lnRef idx="2">
-              <a:schemeClr val="accent1"/>
-            </a:lnRef>
-            <a:fillRef idx="0">
-              <a:schemeClr val="accent1"/>
-            </a:fillRef>
-            <a:effectRef idx="1">
-              <a:schemeClr val="accent1"/>
-            </a:effectRef>
-            <a:fontRef idx="minor">
-              <a:schemeClr val="tx1"/>
-            </a:fontRef>
-          </p:style>
-        </p:cxnSp>
-        <p:cxnSp>
-          <p:nvCxnSpPr>
-            <p:cNvPr id="26" name="Straight Connector 25">
-              <a:extLst>
-                <a:ext uri="{FF2B5EF4-FFF2-40B4-BE49-F238E27FC236}">
-                  <a16:creationId xmlns:a16="http://schemas.microsoft.com/office/drawing/2014/main" id="{422F012F-0680-4AEC-9884-BA712ED2B9E6}"/>
-                </a:ext>
-                <a:ext uri="{C183D7F6-B498-43B3-948B-1728B52AA6E4}">
-                  <adec:decorative xmlns:adec="http://schemas.microsoft.com/office/drawing/2017/decorative" val="1"/>
-                </a:ext>
-              </a:extLst>
-            </p:cNvPr>
-            <p:cNvCxnSpPr/>
-            <p:nvPr>
-              <p:extLst>
-                <p:ext uri="{386F3935-93C4-4BCD-93E2-E3B085C9AB24}">
-                  <p16:designElem xmlns:p16="http://schemas.microsoft.com/office/powerpoint/2015/main" val="1"/>
-                </p:ext>
-              </p:extLst>
-            </p:nvPr>
-          </p:nvCxnSpPr>
-          <p:spPr>
-            <a:xfrm flipH="1">
-              <a:off x="9206969" y="3190344"/>
-              <a:ext cx="2981857" cy="2981856"/>
-            </a:xfrm>
-            <a:prstGeom prst="line">
-              <a:avLst/>
-            </a:prstGeom>
-            <a:ln w="9525">
-              <a:solidFill>
-                <a:srgbClr val="FFFFFF"/>
-              </a:solidFill>
-            </a:ln>
-          </p:spPr>
-          <p:style>
-            <a:lnRef idx="2">
-              <a:schemeClr val="accent1"/>
-            </a:lnRef>
-            <a:fillRef idx="0">
-              <a:schemeClr val="accent1"/>
-            </a:fillRef>
-            <a:effectRef idx="1">
-              <a:schemeClr val="accent1"/>
-            </a:effectRef>
-            <a:fontRef idx="minor">
-              <a:schemeClr val="tx1"/>
-            </a:fontRef>
-          </p:style>
-        </p:cxnSp>
-        <p:cxnSp>
-          <p:nvCxnSpPr>
-            <p:cNvPr id="27" name="Straight Connector 26">
-              <a:extLst>
-                <a:ext uri="{FF2B5EF4-FFF2-40B4-BE49-F238E27FC236}">
-                  <a16:creationId xmlns:a16="http://schemas.microsoft.com/office/drawing/2014/main" id="{FA5CEDFE-9EC8-436B-AE10-F85A847783A2}"/>
-                </a:ext>
-                <a:ext uri="{C183D7F6-B498-43B3-948B-1728B52AA6E4}">
-                  <adec:decorative xmlns:adec="http://schemas.microsoft.com/office/drawing/2017/decorative" val="1"/>
-                </a:ext>
-              </a:extLst>
-            </p:cNvPr>
-            <p:cNvCxnSpPr/>
-            <p:nvPr>
-              <p:extLst>
-                <p:ext uri="{386F3935-93C4-4BCD-93E2-E3B085C9AB24}">
-                  <p16:designElem xmlns:p16="http://schemas.microsoft.com/office/powerpoint/2015/main" val="1"/>
-                </p:ext>
-              </p:extLst>
-            </p:nvPr>
-          </p:nvCxnSpPr>
-          <p:spPr>
-            <a:xfrm flipH="1">
-              <a:off x="10292292" y="3285067"/>
-              <a:ext cx="1896534" cy="1896533"/>
-            </a:xfrm>
-            <a:prstGeom prst="line">
-              <a:avLst/>
-            </a:prstGeom>
-            <a:ln w="9525">
-              <a:solidFill>
-                <a:srgbClr val="FFFFFF"/>
-              </a:solidFill>
-            </a:ln>
-          </p:spPr>
-          <p:style>
-            <a:lnRef idx="2">
-              <a:schemeClr val="accent1"/>
-            </a:lnRef>
-            <a:fillRef idx="0">
-              <a:schemeClr val="accent1"/>
-            </a:fillRef>
-            <a:effectRef idx="1">
-              <a:schemeClr val="accent1"/>
-            </a:effectRef>
-            <a:fontRef idx="minor">
-              <a:schemeClr val="tx1"/>
-            </a:fontRef>
-          </p:style>
-        </p:cxnSp>
-        <p:cxnSp>
-          <p:nvCxnSpPr>
-            <p:cNvPr id="28" name="Straight Connector 27">
-              <a:extLst>
-                <a:ext uri="{FF2B5EF4-FFF2-40B4-BE49-F238E27FC236}">
-                  <a16:creationId xmlns:a16="http://schemas.microsoft.com/office/drawing/2014/main" id="{29C70031-55D8-483B-8452-A6B809D0AC84}"/>
-                </a:ext>
-                <a:ext uri="{C183D7F6-B498-43B3-948B-1728B52AA6E4}">
-                  <adec:decorative xmlns:adec="http://schemas.microsoft.com/office/drawing/2017/decorative" val="1"/>
-                </a:ext>
-              </a:extLst>
-            </p:cNvPr>
-            <p:cNvCxnSpPr/>
-            <p:nvPr>
-              <p:extLst>
-                <p:ext uri="{386F3935-93C4-4BCD-93E2-E3B085C9AB24}">
-                  <p16:designElem xmlns:p16="http://schemas.microsoft.com/office/powerpoint/2015/main" val="1"/>
-                </p:ext>
-              </p:extLst>
-            </p:nvPr>
-          </p:nvCxnSpPr>
-          <p:spPr>
-            <a:xfrm flipH="1">
-              <a:off x="10443103" y="3131080"/>
-              <a:ext cx="1745722" cy="1745720"/>
-            </a:xfrm>
-            <a:prstGeom prst="line">
-              <a:avLst/>
-            </a:prstGeom>
-            <a:ln w="28575">
-              <a:solidFill>
-                <a:srgbClr val="FFFFFF"/>
-              </a:solidFill>
-            </a:ln>
-          </p:spPr>
-          <p:style>
-            <a:lnRef idx="2">
-              <a:schemeClr val="accent1"/>
-            </a:lnRef>
-            <a:fillRef idx="0">
-              <a:schemeClr val="accent1"/>
-            </a:fillRef>
-            <a:effectRef idx="1">
-              <a:schemeClr val="accent1"/>
-            </a:effectRef>
-            <a:fontRef idx="minor">
-              <a:schemeClr val="tx1"/>
-            </a:fontRef>
-          </p:style>
-        </p:cxnSp>
-        <p:cxnSp>
-          <p:nvCxnSpPr>
-            <p:cNvPr id="29" name="Straight Connector 28">
-              <a:extLst>
-                <a:ext uri="{FF2B5EF4-FFF2-40B4-BE49-F238E27FC236}">
-                  <a16:creationId xmlns:a16="http://schemas.microsoft.com/office/drawing/2014/main" id="{E24F1E16-B0BE-4400-9A10-95BB1D52CCD2}"/>
-                </a:ext>
-                <a:ext uri="{C183D7F6-B498-43B3-948B-1728B52AA6E4}">
-                  <adec:decorative xmlns:adec="http://schemas.microsoft.com/office/drawing/2017/decorative" val="1"/>
-                </a:ext>
-              </a:extLst>
-            </p:cNvPr>
-            <p:cNvCxnSpPr/>
-            <p:nvPr>
-              <p:extLst>
-                <p:ext uri="{386F3935-93C4-4BCD-93E2-E3B085C9AB24}">
-                  <p16:designElem xmlns:p16="http://schemas.microsoft.com/office/powerpoint/2015/main" val="1"/>
-                </p:ext>
-              </p:extLst>
-            </p:nvPr>
-          </p:nvCxnSpPr>
-          <p:spPr>
-            <a:xfrm flipH="1">
-              <a:off x="10918826" y="3683001"/>
-              <a:ext cx="1270001" cy="1269999"/>
-            </a:xfrm>
-            <a:prstGeom prst="line">
-              <a:avLst/>
-            </a:prstGeom>
-            <a:ln w="28575">
-              <a:solidFill>
-                <a:srgbClr val="FFFFFF"/>
-              </a:solidFill>
-            </a:ln>
-          </p:spPr>
-          <p:style>
-            <a:lnRef idx="2">
-              <a:schemeClr val="accent1"/>
-            </a:lnRef>
-            <a:fillRef idx="0">
-              <a:schemeClr val="accent1"/>
-            </a:fillRef>
-            <a:effectRef idx="1">
-              <a:schemeClr val="accent1"/>
-            </a:effectRef>
-            <a:fontRef idx="minor">
-              <a:schemeClr val="tx1"/>
-            </a:fontRef>
-          </p:style>
-        </p:cxnSp>
-      </p:grpSp>
-      <p:sp>
-        <p:nvSpPr>
-          <p:cNvPr id="2" name="Title 1">
-            <a:extLst>
-              <a:ext uri="{FF2B5EF4-FFF2-40B4-BE49-F238E27FC236}">
-                <a16:creationId xmlns:a16="http://schemas.microsoft.com/office/drawing/2014/main" id="{0E014BC6-E8B9-4831-9870-0A8705DC795A}"/>
-              </a:ext>
-            </a:extLst>
-          </p:cNvPr>
-          <p:cNvSpPr>
-            <a:spLocks noGrp="1"/>
-          </p:cNvSpPr>
-          <p:nvPr>
-            <p:ph type="title"/>
-          </p:nvPr>
-        </p:nvSpPr>
-        <p:spPr>
-          <a:xfrm>
-            <a:off x="5116738" y="685798"/>
-            <a:ext cx="6159273" cy="4495801"/>
-          </a:xfrm>
-        </p:spPr>
-        <p:txBody>
-          <a:bodyPr vert="horz" lIns="91440" tIns="45720" rIns="91440" bIns="45720" rtlCol="0" anchor="ctr">
-            <a:normAutofit/>
-          </a:bodyPr>
-          <a:lstStyle/>
-          <a:p>
-            <a:r>
-              <a:rPr lang="en-US" sz="5400" dirty="0" err="1">
-                <a:solidFill>
-                  <a:srgbClr val="FFFFFF"/>
-                </a:solidFill>
-              </a:rPr>
-              <a:t>Vragen</a:t>
-            </a:r>
-            <a:r>
-              <a:rPr lang="en-US" sz="5400" dirty="0">
-                <a:solidFill>
-                  <a:srgbClr val="FFFFFF"/>
-                </a:solidFill>
-              </a:rPr>
-              <a:t>?</a:t>
-            </a:r>
-          </a:p>
-        </p:txBody>
-      </p:sp>
-    </p:spTree>
-    <p:extLst>
-      <p:ext uri="{BB962C8B-B14F-4D97-AF65-F5344CB8AC3E}">
-        <p14:creationId xmlns:p14="http://schemas.microsoft.com/office/powerpoint/2010/main" val="2841415295"/>
       </p:ext>
     </p:extLst>
   </p:cSld>

</xml_diff>